<commit_message>
2024 additions and edits
</commit_message>
<xml_diff>
--- a/slides/PS4106 - debugging.pptx
+++ b/slides/PS4106 - debugging.pptx
@@ -17,14 +17,17 @@
     <p:sldId id="273" r:id="rId11"/>
     <p:sldId id="275" r:id="rId12"/>
     <p:sldId id="274" r:id="rId13"/>
-    <p:sldId id="259" r:id="rId14"/>
-    <p:sldId id="265" r:id="rId15"/>
-    <p:sldId id="266" r:id="rId16"/>
-    <p:sldId id="267" r:id="rId17"/>
-    <p:sldId id="269" r:id="rId18"/>
-    <p:sldId id="268" r:id="rId19"/>
-    <p:sldId id="271" r:id="rId20"/>
-    <p:sldId id="272" r:id="rId21"/>
+    <p:sldId id="276" r:id="rId14"/>
+    <p:sldId id="277" r:id="rId15"/>
+    <p:sldId id="278" r:id="rId16"/>
+    <p:sldId id="259" r:id="rId17"/>
+    <p:sldId id="265" r:id="rId18"/>
+    <p:sldId id="266" r:id="rId19"/>
+    <p:sldId id="267" r:id="rId20"/>
+    <p:sldId id="269" r:id="rId21"/>
+    <p:sldId id="268" r:id="rId22"/>
+    <p:sldId id="271" r:id="rId23"/>
+    <p:sldId id="272" r:id="rId24"/>
   </p:sldIdLst>
   <p:sldSz cx="12192000" cy="6858000"/>
   <p:notesSz cx="6858000" cy="9144000"/>
@@ -280,7 +283,7 @@
           <a:p>
             <a:fld id="{BE379DB5-90DC-CA4E-850A-C726A3332936}" type="datetimeFigureOut">
               <a:rPr lang="en-US" smtClean="0"/>
-              <a:t>9/20/23</a:t>
+              <a:t>9/25/24</a:t>
             </a:fld>
             <a:endParaRPr lang="en-US"/>
           </a:p>
@@ -480,7 +483,7 @@
           <a:p>
             <a:fld id="{BE379DB5-90DC-CA4E-850A-C726A3332936}" type="datetimeFigureOut">
               <a:rPr lang="en-US" smtClean="0"/>
-              <a:t>9/20/23</a:t>
+              <a:t>9/25/24</a:t>
             </a:fld>
             <a:endParaRPr lang="en-US"/>
           </a:p>
@@ -690,7 +693,7 @@
           <a:p>
             <a:fld id="{BE379DB5-90DC-CA4E-850A-C726A3332936}" type="datetimeFigureOut">
               <a:rPr lang="en-US" smtClean="0"/>
-              <a:t>9/20/23</a:t>
+              <a:t>9/25/24</a:t>
             </a:fld>
             <a:endParaRPr lang="en-US"/>
           </a:p>
@@ -890,7 +893,7 @@
           <a:p>
             <a:fld id="{BE379DB5-90DC-CA4E-850A-C726A3332936}" type="datetimeFigureOut">
               <a:rPr lang="en-US" smtClean="0"/>
-              <a:t>9/20/23</a:t>
+              <a:t>9/25/24</a:t>
             </a:fld>
             <a:endParaRPr lang="en-US"/>
           </a:p>
@@ -1166,7 +1169,7 @@
           <a:p>
             <a:fld id="{BE379DB5-90DC-CA4E-850A-C726A3332936}" type="datetimeFigureOut">
               <a:rPr lang="en-US" smtClean="0"/>
-              <a:t>9/20/23</a:t>
+              <a:t>9/25/24</a:t>
             </a:fld>
             <a:endParaRPr lang="en-US"/>
           </a:p>
@@ -1434,7 +1437,7 @@
           <a:p>
             <a:fld id="{BE379DB5-90DC-CA4E-850A-C726A3332936}" type="datetimeFigureOut">
               <a:rPr lang="en-US" smtClean="0"/>
-              <a:t>9/20/23</a:t>
+              <a:t>9/25/24</a:t>
             </a:fld>
             <a:endParaRPr lang="en-US"/>
           </a:p>
@@ -1849,7 +1852,7 @@
           <a:p>
             <a:fld id="{BE379DB5-90DC-CA4E-850A-C726A3332936}" type="datetimeFigureOut">
               <a:rPr lang="en-US" smtClean="0"/>
-              <a:t>9/20/23</a:t>
+              <a:t>9/25/24</a:t>
             </a:fld>
             <a:endParaRPr lang="en-US"/>
           </a:p>
@@ -1991,7 +1994,7 @@
           <a:p>
             <a:fld id="{BE379DB5-90DC-CA4E-850A-C726A3332936}" type="datetimeFigureOut">
               <a:rPr lang="en-US" smtClean="0"/>
-              <a:t>9/20/23</a:t>
+              <a:t>9/25/24</a:t>
             </a:fld>
             <a:endParaRPr lang="en-US"/>
           </a:p>
@@ -2104,7 +2107,7 @@
           <a:p>
             <a:fld id="{BE379DB5-90DC-CA4E-850A-C726A3332936}" type="datetimeFigureOut">
               <a:rPr lang="en-US" smtClean="0"/>
-              <a:t>9/20/23</a:t>
+              <a:t>9/25/24</a:t>
             </a:fld>
             <a:endParaRPr lang="en-US"/>
           </a:p>
@@ -2417,7 +2420,7 @@
           <a:p>
             <a:fld id="{BE379DB5-90DC-CA4E-850A-C726A3332936}" type="datetimeFigureOut">
               <a:rPr lang="en-US" smtClean="0"/>
-              <a:t>9/20/23</a:t>
+              <a:t>9/25/24</a:t>
             </a:fld>
             <a:endParaRPr lang="en-US"/>
           </a:p>
@@ -2706,7 +2709,7 @@
           <a:p>
             <a:fld id="{BE379DB5-90DC-CA4E-850A-C726A3332936}" type="datetimeFigureOut">
               <a:rPr lang="en-US" smtClean="0"/>
-              <a:t>9/20/23</a:t>
+              <a:t>9/25/24</a:t>
             </a:fld>
             <a:endParaRPr lang="en-US"/>
           </a:p>
@@ -2949,7 +2952,7 @@
           <a:p>
             <a:fld id="{BE379DB5-90DC-CA4E-850A-C726A3332936}" type="datetimeFigureOut">
               <a:rPr lang="en-US" smtClean="0"/>
-              <a:t>9/20/23</a:t>
+              <a:t>9/25/24</a:t>
             </a:fld>
             <a:endParaRPr lang="en-US"/>
           </a:p>
@@ -3417,7 +3420,7 @@
           <a:p>
             <a:r>
               <a:rPr lang="en-US" dirty="0"/>
-              <a:t>PS4106 </a:t>
+              <a:t>PN4106 </a:t>
             </a:r>
             <a:endParaRPr lang="en-US" b="1" dirty="0"/>
           </a:p>
@@ -3937,7 +3940,7 @@
           <p:cNvPr id="2" name="Title 1">
             <a:extLst>
               <a:ext uri="{FF2B5EF4-FFF2-40B4-BE49-F238E27FC236}">
-                <a16:creationId xmlns:a16="http://schemas.microsoft.com/office/drawing/2014/main" id="{66D9E06A-E4A3-7942-B436-E71CD3E153C9}"/>
+                <a16:creationId xmlns:a16="http://schemas.microsoft.com/office/drawing/2014/main" id="{4E76342B-3A96-756C-8E4E-22D018FA47FC}"/>
               </a:ext>
             </a:extLst>
           </p:cNvPr>
@@ -3953,101 +3956,318 @@
           <a:bodyPr/>
           <a:lstStyle/>
           <a:p>
-            <a:r>
-              <a:rPr lang="en-GB" dirty="0"/>
-              <a:t>Change One Thing at a Time, For a Reason</a:t>
-            </a:r>
-            <a:br>
-              <a:rPr lang="en-GB" dirty="0"/>
-            </a:br>
-            <a:endParaRPr lang="en-US" dirty="0"/>
-          </a:p>
-        </p:txBody>
-      </p:sp>
-      <p:sp>
-        <p:nvSpPr>
-          <p:cNvPr id="3" name="Content Placeholder 2">
-            <a:extLst>
-              <a:ext uri="{FF2B5EF4-FFF2-40B4-BE49-F238E27FC236}">
-                <a16:creationId xmlns:a16="http://schemas.microsoft.com/office/drawing/2014/main" id="{ED89CA62-A21E-3A40-9750-C7371CD44AFA}"/>
-              </a:ext>
-            </a:extLst>
-          </p:cNvPr>
-          <p:cNvSpPr>
-            <a:spLocks noGrp="1"/>
-          </p:cNvSpPr>
+            <a:endParaRPr lang="en-US"/>
+          </a:p>
+        </p:txBody>
+      </p:sp>
+      <p:pic>
+        <p:nvPicPr>
+          <p:cNvPr id="5" name="Content Placeholder 4" descr="A screenshot of a computer&#10;&#10;Description automatically generated">
+            <a:extLst>
+              <a:ext uri="{FF2B5EF4-FFF2-40B4-BE49-F238E27FC236}">
+                <a16:creationId xmlns:a16="http://schemas.microsoft.com/office/drawing/2014/main" id="{C1C9F6C2-4FB6-FA13-1E34-D26F99EF2DBE}"/>
+              </a:ext>
+            </a:extLst>
+          </p:cNvPr>
+          <p:cNvPicPr>
+            <a:picLocks noGrp="1" noChangeAspect="1"/>
+          </p:cNvPicPr>
           <p:nvPr>
             <p:ph idx="1"/>
           </p:nvPr>
-        </p:nvSpPr>
-        <p:spPr/>
-        <p:txBody>
-          <a:bodyPr/>
-          <a:lstStyle/>
-          <a:p>
-            <a:r>
-              <a:rPr lang="en-GB" dirty="0"/>
-              <a:t>Replacing random chunks of code is unlikely to do much good.</a:t>
-            </a:r>
-          </a:p>
-          <a:p>
-            <a:pPr lvl="1"/>
-            <a:r>
-              <a:rPr lang="en-GB" dirty="0"/>
-              <a:t> (After all, if you got it wrong the first time, you’ll probably get it wrong the second and third as well.)</a:t>
-            </a:r>
-          </a:p>
-          <a:p>
-            <a:r>
-              <a:rPr lang="en-GB" dirty="0"/>
-              <a:t>Make changes for a Reason.  Either to:</a:t>
-            </a:r>
-          </a:p>
-          <a:p>
-            <a:pPr lvl="1"/>
-            <a:r>
-              <a:rPr lang="en-GB" dirty="0"/>
-              <a:t>Gather more information (e.g. is bug still here if I do X)</a:t>
-            </a:r>
-          </a:p>
-          <a:p>
-            <a:pPr lvl="1"/>
-            <a:r>
-              <a:rPr lang="en-GB" dirty="0"/>
-              <a:t>Test a potential fix</a:t>
-            </a:r>
-          </a:p>
-          <a:p>
-            <a:endParaRPr lang="en-GB" dirty="0"/>
-          </a:p>
-          <a:p>
-            <a:r>
-              <a:rPr lang="en-GB" dirty="0"/>
-              <a:t>Use test inputs (e.g. smaller/simpler things)</a:t>
-            </a:r>
-          </a:p>
-          <a:p>
-            <a:endParaRPr lang="en-GB" dirty="0"/>
-          </a:p>
-          <a:p>
-            <a:pPr lvl="1"/>
-            <a:endParaRPr lang="en-GB" dirty="0"/>
-          </a:p>
-          <a:p>
-            <a:endParaRPr lang="en-US" dirty="0"/>
-          </a:p>
-        </p:txBody>
-      </p:sp>
+        </p:nvPicPr>
+        <p:blipFill>
+          <a:blip r:embed="rId2"/>
+          <a:srcRect l="1" r="-198" b="50000"/>
+          <a:stretch/>
+        </p:blipFill>
+        <p:spPr>
+          <a:xfrm>
+            <a:off x="498368" y="798513"/>
+            <a:ext cx="11217382" cy="2630488"/>
+          </a:xfrm>
+        </p:spPr>
+      </p:pic>
+      <p:grpSp>
+        <p:nvGrpSpPr>
+          <p:cNvPr id="12" name="Group 11">
+            <a:extLst>
+              <a:ext uri="{FF2B5EF4-FFF2-40B4-BE49-F238E27FC236}">
+                <a16:creationId xmlns:a16="http://schemas.microsoft.com/office/drawing/2014/main" id="{365E6383-9918-F601-DD30-6F49D75BEE7D}"/>
+              </a:ext>
+            </a:extLst>
+          </p:cNvPr>
+          <p:cNvGrpSpPr/>
+          <p:nvPr/>
+        </p:nvGrpSpPr>
+        <p:grpSpPr>
+          <a:xfrm>
+            <a:off x="838200" y="209550"/>
+            <a:ext cx="10515600" cy="5777092"/>
+            <a:chOff x="838200" y="209550"/>
+            <a:chExt cx="10515600" cy="5777092"/>
+          </a:xfrm>
+        </p:grpSpPr>
+        <p:cxnSp>
+          <p:nvCxnSpPr>
+            <p:cNvPr id="6" name="Straight Arrow Connector 5">
+              <a:extLst>
+                <a:ext uri="{FF2B5EF4-FFF2-40B4-BE49-F238E27FC236}">
+                  <a16:creationId xmlns:a16="http://schemas.microsoft.com/office/drawing/2014/main" id="{ADDD5344-FE4D-59D6-CBC2-729CCF6F52BB}"/>
+                </a:ext>
+              </a:extLst>
+            </p:cNvPr>
+            <p:cNvCxnSpPr>
+              <a:cxnSpLocks/>
+            </p:cNvCxnSpPr>
+            <p:nvPr/>
+          </p:nvCxnSpPr>
+          <p:spPr>
+            <a:xfrm flipH="1">
+              <a:off x="5010150" y="3048000"/>
+              <a:ext cx="2647950" cy="2095500"/>
+            </a:xfrm>
+            <a:prstGeom prst="straightConnector1">
+              <a:avLst/>
+            </a:prstGeom>
+            <a:ln w="57150">
+              <a:tailEnd type="triangle"/>
+            </a:ln>
+          </p:spPr>
+          <p:style>
+            <a:lnRef idx="1">
+              <a:schemeClr val="accent1"/>
+            </a:lnRef>
+            <a:fillRef idx="0">
+              <a:schemeClr val="accent1"/>
+            </a:fillRef>
+            <a:effectRef idx="0">
+              <a:schemeClr val="accent1"/>
+            </a:effectRef>
+            <a:fontRef idx="minor">
+              <a:schemeClr val="tx1"/>
+            </a:fontRef>
+          </p:style>
+        </p:cxnSp>
+        <p:sp>
+          <p:nvSpPr>
+            <p:cNvPr id="8" name="Doughnut 7">
+              <a:extLst>
+                <a:ext uri="{FF2B5EF4-FFF2-40B4-BE49-F238E27FC236}">
+                  <a16:creationId xmlns:a16="http://schemas.microsoft.com/office/drawing/2014/main" id="{2B2E84F8-0DD9-CCB7-DD36-1794B14FCB10}"/>
+                </a:ext>
+              </a:extLst>
+            </p:cNvPr>
+            <p:cNvSpPr/>
+            <p:nvPr/>
+          </p:nvSpPr>
+          <p:spPr>
+            <a:xfrm>
+              <a:off x="6667500" y="209550"/>
+              <a:ext cx="4686300" cy="3219450"/>
+            </a:xfrm>
+            <a:prstGeom prst="donut">
+              <a:avLst>
+                <a:gd name="adj" fmla="val 6148"/>
+              </a:avLst>
+            </a:prstGeom>
+            <a:ln w="12700"/>
+          </p:spPr>
+          <p:style>
+            <a:lnRef idx="2">
+              <a:schemeClr val="accent1">
+                <a:shade val="50000"/>
+              </a:schemeClr>
+            </a:lnRef>
+            <a:fillRef idx="1">
+              <a:schemeClr val="accent1"/>
+            </a:fillRef>
+            <a:effectRef idx="0">
+              <a:schemeClr val="accent1"/>
+            </a:effectRef>
+            <a:fontRef idx="minor">
+              <a:schemeClr val="lt1"/>
+            </a:fontRef>
+          </p:style>
+          <p:txBody>
+            <a:bodyPr rtlCol="0" anchor="ctr"/>
+            <a:lstStyle/>
+            <a:p>
+              <a:pPr algn="ctr"/>
+              <a:endParaRPr lang="en-US">
+                <a:solidFill>
+                  <a:schemeClr val="tx1"/>
+                </a:solidFill>
+              </a:endParaRPr>
+            </a:p>
+          </p:txBody>
+        </p:sp>
+        <p:sp>
+          <p:nvSpPr>
+            <p:cNvPr id="9" name="TextBox 8">
+              <a:extLst>
+                <a:ext uri="{FF2B5EF4-FFF2-40B4-BE49-F238E27FC236}">
+                  <a16:creationId xmlns:a16="http://schemas.microsoft.com/office/drawing/2014/main" id="{724A0ECC-4761-0DCE-9260-54B5E45A8D5F}"/>
+                </a:ext>
+              </a:extLst>
+            </p:cNvPr>
+            <p:cNvSpPr txBox="1"/>
+            <p:nvPr/>
+          </p:nvSpPr>
+          <p:spPr>
+            <a:xfrm>
+              <a:off x="838200" y="4786313"/>
+              <a:ext cx="5029200" cy="1200329"/>
+            </a:xfrm>
+            <a:prstGeom prst="rect">
+              <a:avLst/>
+            </a:prstGeom>
+            <a:noFill/>
+          </p:spPr>
+          <p:txBody>
+            <a:bodyPr wrap="square" rtlCol="0">
+              <a:spAutoFit/>
+            </a:bodyPr>
+            <a:lstStyle/>
+            <a:p>
+              <a:r>
+                <a:rPr lang="en-US" sz="3600" dirty="0"/>
+                <a:t>Shows the current variables and their values</a:t>
+              </a:r>
+            </a:p>
+          </p:txBody>
+        </p:sp>
+      </p:grpSp>
     </p:spTree>
     <p:extLst>
       <p:ext uri="{BB962C8B-B14F-4D97-AF65-F5344CB8AC3E}">
-        <p14:creationId xmlns:p14="http://schemas.microsoft.com/office/powerpoint/2010/main" val="2485514461"/>
+        <p14:creationId xmlns:p14="http://schemas.microsoft.com/office/powerpoint/2010/main" val="3033349739"/>
       </p:ext>
     </p:extLst>
   </p:cSld>
   <p:clrMapOvr>
     <a:masterClrMapping/>
   </p:clrMapOvr>
+  <p:timing>
+    <p:tnLst>
+      <p:par>
+        <p:cTn id="1" dur="indefinite" restart="never" nodeType="tmRoot">
+          <p:childTnLst>
+            <p:seq concurrent="1" nextAc="seek">
+              <p:cTn id="2" dur="indefinite" nodeType="mainSeq">
+                <p:childTnLst>
+                  <p:par>
+                    <p:cTn id="3" fill="hold">
+                      <p:stCondLst>
+                        <p:cond delay="indefinite"/>
+                      </p:stCondLst>
+                      <p:childTnLst>
+                        <p:par>
+                          <p:cTn id="4" fill="hold">
+                            <p:stCondLst>
+                              <p:cond delay="0"/>
+                            </p:stCondLst>
+                            <p:childTnLst>
+                              <p:par>
+                                <p:cTn id="5" presetID="1" presetClass="entr" presetSubtype="0" fill="hold" nodeType="clickEffect">
+                                  <p:stCondLst>
+                                    <p:cond delay="0"/>
+                                  </p:stCondLst>
+                                  <p:childTnLst>
+                                    <p:set>
+                                      <p:cBhvr>
+                                        <p:cTn id="6" dur="1" fill="hold">
+                                          <p:stCondLst>
+                                            <p:cond delay="0"/>
+                                          </p:stCondLst>
+                                        </p:cTn>
+                                        <p:tgtEl>
+                                          <p:spTgt spid="12"/>
+                                        </p:tgtEl>
+                                        <p:attrNameLst>
+                                          <p:attrName>style.visibility</p:attrName>
+                                        </p:attrNameLst>
+                                      </p:cBhvr>
+                                      <p:to>
+                                        <p:strVal val="visible"/>
+                                      </p:to>
+                                    </p:set>
+                                  </p:childTnLst>
+                                </p:cTn>
+                              </p:par>
+                            </p:childTnLst>
+                          </p:cTn>
+                        </p:par>
+                      </p:childTnLst>
+                    </p:cTn>
+                  </p:par>
+                  <p:par>
+                    <p:cTn id="7" fill="hold">
+                      <p:stCondLst>
+                        <p:cond delay="indefinite"/>
+                      </p:stCondLst>
+                      <p:childTnLst>
+                        <p:par>
+                          <p:cTn id="8" fill="hold">
+                            <p:stCondLst>
+                              <p:cond delay="0"/>
+                            </p:stCondLst>
+                            <p:childTnLst>
+                              <p:par>
+                                <p:cTn id="9" presetID="1" presetClass="entr" presetSubtype="0" fill="hold" nodeType="clickEffect">
+                                  <p:stCondLst>
+                                    <p:cond delay="0"/>
+                                  </p:stCondLst>
+                                  <p:childTnLst>
+                                    <p:set>
+                                      <p:cBhvr>
+                                        <p:cTn id="10" dur="1" fill="hold">
+                                          <p:stCondLst>
+                                            <p:cond delay="0"/>
+                                          </p:stCondLst>
+                                        </p:cTn>
+                                        <p:tgtEl>
+                                          <p:spTgt spid="12"/>
+                                        </p:tgtEl>
+                                        <p:attrNameLst>
+                                          <p:attrName>style.visibility</p:attrName>
+                                        </p:attrNameLst>
+                                      </p:cBhvr>
+                                      <p:to>
+                                        <p:strVal val="visible"/>
+                                      </p:to>
+                                    </p:set>
+                                  </p:childTnLst>
+                                </p:cTn>
+                              </p:par>
+                            </p:childTnLst>
+                          </p:cTn>
+                        </p:par>
+                      </p:childTnLst>
+                    </p:cTn>
+                  </p:par>
+                </p:childTnLst>
+              </p:cTn>
+              <p:prevCondLst>
+                <p:cond evt="onPrev" delay="0">
+                  <p:tgtEl>
+                    <p:sldTgt/>
+                  </p:tgtEl>
+                </p:cond>
+              </p:prevCondLst>
+              <p:nextCondLst>
+                <p:cond evt="onNext" delay="0">
+                  <p:tgtEl>
+                    <p:sldTgt/>
+                  </p:tgtEl>
+                </p:cond>
+              </p:nextCondLst>
+            </p:seq>
+          </p:childTnLst>
+        </p:cTn>
+      </p:par>
+    </p:tnLst>
+  </p:timing>
 </p:sld>
 </file>
 
@@ -4073,6 +4293,858 @@
           <p:cNvPr id="2" name="Title 1">
             <a:extLst>
               <a:ext uri="{FF2B5EF4-FFF2-40B4-BE49-F238E27FC236}">
+                <a16:creationId xmlns:a16="http://schemas.microsoft.com/office/drawing/2014/main" id="{4D1EE966-EC9A-3C83-C734-90FED3E4BB2E}"/>
+              </a:ext>
+            </a:extLst>
+          </p:cNvPr>
+          <p:cNvSpPr>
+            <a:spLocks noGrp="1"/>
+          </p:cNvSpPr>
+          <p:nvPr>
+            <p:ph type="title"/>
+          </p:nvPr>
+        </p:nvSpPr>
+        <p:spPr/>
+        <p:txBody>
+          <a:bodyPr/>
+          <a:lstStyle/>
+          <a:p>
+            <a:endParaRPr lang="en-US"/>
+          </a:p>
+        </p:txBody>
+      </p:sp>
+      <p:pic>
+        <p:nvPicPr>
+          <p:cNvPr id="5" name="Content Placeholder 4" descr="A screenshot of a computer&#10;&#10;Description automatically generated">
+            <a:extLst>
+              <a:ext uri="{FF2B5EF4-FFF2-40B4-BE49-F238E27FC236}">
+                <a16:creationId xmlns:a16="http://schemas.microsoft.com/office/drawing/2014/main" id="{A9A4543B-F60B-CE24-7FA3-26B920E4CECD}"/>
+              </a:ext>
+            </a:extLst>
+          </p:cNvPr>
+          <p:cNvPicPr>
+            <a:picLocks noGrp="1" noChangeAspect="1"/>
+          </p:cNvPicPr>
+          <p:nvPr>
+            <p:ph idx="1"/>
+          </p:nvPr>
+        </p:nvPicPr>
+        <p:blipFill>
+          <a:blip r:embed="rId2"/>
+          <a:stretch>
+            <a:fillRect/>
+          </a:stretch>
+        </p:blipFill>
+        <p:spPr>
+          <a:xfrm>
+            <a:off x="838200" y="273812"/>
+            <a:ext cx="10515600" cy="3994214"/>
+          </a:xfrm>
+        </p:spPr>
+      </p:pic>
+      <p:grpSp>
+        <p:nvGrpSpPr>
+          <p:cNvPr id="6" name="Group 5">
+            <a:extLst>
+              <a:ext uri="{FF2B5EF4-FFF2-40B4-BE49-F238E27FC236}">
+                <a16:creationId xmlns:a16="http://schemas.microsoft.com/office/drawing/2014/main" id="{CF062DDF-856F-93C4-444C-AF2437A0C899}"/>
+              </a:ext>
+            </a:extLst>
+          </p:cNvPr>
+          <p:cNvGrpSpPr/>
+          <p:nvPr/>
+        </p:nvGrpSpPr>
+        <p:grpSpPr>
+          <a:xfrm>
+            <a:off x="1028700" y="1543050"/>
+            <a:ext cx="7048500" cy="4599167"/>
+            <a:chOff x="838200" y="1387475"/>
+            <a:chExt cx="7048500" cy="4599167"/>
+          </a:xfrm>
+        </p:grpSpPr>
+        <p:cxnSp>
+          <p:nvCxnSpPr>
+            <p:cNvPr id="7" name="Straight Arrow Connector 6">
+              <a:extLst>
+                <a:ext uri="{FF2B5EF4-FFF2-40B4-BE49-F238E27FC236}">
+                  <a16:creationId xmlns:a16="http://schemas.microsoft.com/office/drawing/2014/main" id="{600DFF5A-0C29-BA6A-5DD4-25BEEA3A7A2B}"/>
+                </a:ext>
+              </a:extLst>
+            </p:cNvPr>
+            <p:cNvCxnSpPr>
+              <a:cxnSpLocks/>
+            </p:cNvCxnSpPr>
+            <p:nvPr/>
+          </p:nvCxnSpPr>
+          <p:spPr>
+            <a:xfrm>
+              <a:off x="1943100" y="2208975"/>
+              <a:ext cx="971550" cy="2817050"/>
+            </a:xfrm>
+            <a:prstGeom prst="straightConnector1">
+              <a:avLst/>
+            </a:prstGeom>
+            <a:ln w="57150">
+              <a:tailEnd type="triangle"/>
+            </a:ln>
+          </p:spPr>
+          <p:style>
+            <a:lnRef idx="1">
+              <a:schemeClr val="accent1"/>
+            </a:lnRef>
+            <a:fillRef idx="0">
+              <a:schemeClr val="accent1"/>
+            </a:fillRef>
+            <a:effectRef idx="0">
+              <a:schemeClr val="accent1"/>
+            </a:effectRef>
+            <a:fontRef idx="minor">
+              <a:schemeClr val="tx1"/>
+            </a:fontRef>
+          </p:style>
+        </p:cxnSp>
+        <p:sp>
+          <p:nvSpPr>
+            <p:cNvPr id="8" name="Doughnut 7">
+              <a:extLst>
+                <a:ext uri="{FF2B5EF4-FFF2-40B4-BE49-F238E27FC236}">
+                  <a16:creationId xmlns:a16="http://schemas.microsoft.com/office/drawing/2014/main" id="{FCCFA71E-65F8-57C8-7E4A-86AB0F88C4A3}"/>
+                </a:ext>
+              </a:extLst>
+            </p:cNvPr>
+            <p:cNvSpPr/>
+            <p:nvPr/>
+          </p:nvSpPr>
+          <p:spPr>
+            <a:xfrm>
+              <a:off x="1181100" y="1387475"/>
+              <a:ext cx="971550" cy="821500"/>
+            </a:xfrm>
+            <a:prstGeom prst="donut">
+              <a:avLst>
+                <a:gd name="adj" fmla="val 6148"/>
+              </a:avLst>
+            </a:prstGeom>
+            <a:ln w="12700"/>
+          </p:spPr>
+          <p:style>
+            <a:lnRef idx="2">
+              <a:schemeClr val="accent1">
+                <a:shade val="50000"/>
+              </a:schemeClr>
+            </a:lnRef>
+            <a:fillRef idx="1">
+              <a:schemeClr val="accent1"/>
+            </a:fillRef>
+            <a:effectRef idx="0">
+              <a:schemeClr val="accent1"/>
+            </a:effectRef>
+            <a:fontRef idx="minor">
+              <a:schemeClr val="lt1"/>
+            </a:fontRef>
+          </p:style>
+          <p:txBody>
+            <a:bodyPr rtlCol="0" anchor="ctr"/>
+            <a:lstStyle/>
+            <a:p>
+              <a:pPr algn="ctr"/>
+              <a:endParaRPr lang="en-US">
+                <a:solidFill>
+                  <a:schemeClr val="tx1"/>
+                </a:solidFill>
+              </a:endParaRPr>
+            </a:p>
+          </p:txBody>
+        </p:sp>
+        <p:sp>
+          <p:nvSpPr>
+            <p:cNvPr id="9" name="TextBox 8">
+              <a:extLst>
+                <a:ext uri="{FF2B5EF4-FFF2-40B4-BE49-F238E27FC236}">
+                  <a16:creationId xmlns:a16="http://schemas.microsoft.com/office/drawing/2014/main" id="{90B7BB8A-17FF-F1E3-5157-2FB3B5B5EBDC}"/>
+                </a:ext>
+              </a:extLst>
+            </p:cNvPr>
+            <p:cNvSpPr txBox="1"/>
+            <p:nvPr/>
+          </p:nvSpPr>
+          <p:spPr>
+            <a:xfrm>
+              <a:off x="838200" y="4786313"/>
+              <a:ext cx="7048500" cy="1200329"/>
+            </a:xfrm>
+            <a:prstGeom prst="rect">
+              <a:avLst/>
+            </a:prstGeom>
+            <a:noFill/>
+          </p:spPr>
+          <p:txBody>
+            <a:bodyPr wrap="square" rtlCol="0">
+              <a:spAutoFit/>
+            </a:bodyPr>
+            <a:lstStyle/>
+            <a:p>
+              <a:r>
+                <a:rPr lang="en-US" sz="3600" dirty="0"/>
+                <a:t>Breakpoint: Pauses code execution right before the code line is executed</a:t>
+              </a:r>
+            </a:p>
+          </p:txBody>
+        </p:sp>
+      </p:grpSp>
+    </p:spTree>
+    <p:extLst>
+      <p:ext uri="{BB962C8B-B14F-4D97-AF65-F5344CB8AC3E}">
+        <p14:creationId xmlns:p14="http://schemas.microsoft.com/office/powerpoint/2010/main" val="1192859875"/>
+      </p:ext>
+    </p:extLst>
+  </p:cSld>
+  <p:clrMapOvr>
+    <a:masterClrMapping/>
+  </p:clrMapOvr>
+  <p:timing>
+    <p:tnLst>
+      <p:par>
+        <p:cTn id="1" dur="indefinite" restart="never" nodeType="tmRoot">
+          <p:childTnLst>
+            <p:seq concurrent="1" nextAc="seek">
+              <p:cTn id="2" dur="indefinite" nodeType="mainSeq">
+                <p:childTnLst>
+                  <p:par>
+                    <p:cTn id="3" fill="hold">
+                      <p:stCondLst>
+                        <p:cond delay="indefinite"/>
+                      </p:stCondLst>
+                      <p:childTnLst>
+                        <p:par>
+                          <p:cTn id="4" fill="hold">
+                            <p:stCondLst>
+                              <p:cond delay="0"/>
+                            </p:stCondLst>
+                            <p:childTnLst>
+                              <p:par>
+                                <p:cTn id="5" presetID="1" presetClass="entr" presetSubtype="0" fill="hold" nodeType="clickEffect">
+                                  <p:stCondLst>
+                                    <p:cond delay="0"/>
+                                  </p:stCondLst>
+                                  <p:childTnLst>
+                                    <p:set>
+                                      <p:cBhvr>
+                                        <p:cTn id="6" dur="1" fill="hold">
+                                          <p:stCondLst>
+                                            <p:cond delay="0"/>
+                                          </p:stCondLst>
+                                        </p:cTn>
+                                        <p:tgtEl>
+                                          <p:spTgt spid="6"/>
+                                        </p:tgtEl>
+                                        <p:attrNameLst>
+                                          <p:attrName>style.visibility</p:attrName>
+                                        </p:attrNameLst>
+                                      </p:cBhvr>
+                                      <p:to>
+                                        <p:strVal val="visible"/>
+                                      </p:to>
+                                    </p:set>
+                                  </p:childTnLst>
+                                </p:cTn>
+                              </p:par>
+                            </p:childTnLst>
+                          </p:cTn>
+                        </p:par>
+                      </p:childTnLst>
+                    </p:cTn>
+                  </p:par>
+                  <p:par>
+                    <p:cTn id="7" fill="hold">
+                      <p:stCondLst>
+                        <p:cond delay="indefinite"/>
+                      </p:stCondLst>
+                      <p:childTnLst>
+                        <p:par>
+                          <p:cTn id="8" fill="hold">
+                            <p:stCondLst>
+                              <p:cond delay="0"/>
+                            </p:stCondLst>
+                            <p:childTnLst>
+                              <p:par>
+                                <p:cTn id="9" presetID="1" presetClass="entr" presetSubtype="0" fill="hold" nodeType="clickEffect">
+                                  <p:stCondLst>
+                                    <p:cond delay="0"/>
+                                  </p:stCondLst>
+                                  <p:childTnLst>
+                                    <p:set>
+                                      <p:cBhvr>
+                                        <p:cTn id="10" dur="1" fill="hold">
+                                          <p:stCondLst>
+                                            <p:cond delay="0"/>
+                                          </p:stCondLst>
+                                        </p:cTn>
+                                        <p:tgtEl>
+                                          <p:spTgt spid="6"/>
+                                        </p:tgtEl>
+                                        <p:attrNameLst>
+                                          <p:attrName>style.visibility</p:attrName>
+                                        </p:attrNameLst>
+                                      </p:cBhvr>
+                                      <p:to>
+                                        <p:strVal val="visible"/>
+                                      </p:to>
+                                    </p:set>
+                                  </p:childTnLst>
+                                </p:cTn>
+                              </p:par>
+                            </p:childTnLst>
+                          </p:cTn>
+                        </p:par>
+                      </p:childTnLst>
+                    </p:cTn>
+                  </p:par>
+                </p:childTnLst>
+              </p:cTn>
+              <p:prevCondLst>
+                <p:cond evt="onPrev" delay="0">
+                  <p:tgtEl>
+                    <p:sldTgt/>
+                  </p:tgtEl>
+                </p:cond>
+              </p:prevCondLst>
+              <p:nextCondLst>
+                <p:cond evt="onNext" delay="0">
+                  <p:tgtEl>
+                    <p:sldTgt/>
+                  </p:tgtEl>
+                </p:cond>
+              </p:nextCondLst>
+            </p:seq>
+          </p:childTnLst>
+        </p:cTn>
+      </p:par>
+    </p:tnLst>
+  </p:timing>
+</p:sld>
+</file>
+
+<file path=ppt/slides/slide15.xml><?xml version="1.0" encoding="utf-8"?>
+<p:sld xmlns:a="http://schemas.openxmlformats.org/drawingml/2006/main" xmlns:r="http://schemas.openxmlformats.org/officeDocument/2006/relationships" xmlns:p="http://schemas.openxmlformats.org/presentationml/2006/main">
+  <p:cSld>
+    <p:spTree>
+      <p:nvGrpSpPr>
+        <p:cNvPr id="1" name=""/>
+        <p:cNvGrpSpPr/>
+        <p:nvPr/>
+      </p:nvGrpSpPr>
+      <p:grpSpPr>
+        <a:xfrm>
+          <a:off x="0" y="0"/>
+          <a:ext cx="0" cy="0"/>
+          <a:chOff x="0" y="0"/>
+          <a:chExt cx="0" cy="0"/>
+        </a:xfrm>
+      </p:grpSpPr>
+      <p:sp>
+        <p:nvSpPr>
+          <p:cNvPr id="2" name="Title 1">
+            <a:extLst>
+              <a:ext uri="{FF2B5EF4-FFF2-40B4-BE49-F238E27FC236}">
+                <a16:creationId xmlns:a16="http://schemas.microsoft.com/office/drawing/2014/main" id="{4D1EE966-EC9A-3C83-C734-90FED3E4BB2E}"/>
+              </a:ext>
+            </a:extLst>
+          </p:cNvPr>
+          <p:cNvSpPr>
+            <a:spLocks noGrp="1"/>
+          </p:cNvSpPr>
+          <p:nvPr>
+            <p:ph type="title"/>
+          </p:nvPr>
+        </p:nvSpPr>
+        <p:spPr/>
+        <p:txBody>
+          <a:bodyPr/>
+          <a:lstStyle/>
+          <a:p>
+            <a:endParaRPr lang="en-US"/>
+          </a:p>
+        </p:txBody>
+      </p:sp>
+      <p:pic>
+        <p:nvPicPr>
+          <p:cNvPr id="5" name="Content Placeholder 4" descr="A screenshot of a computer&#10;&#10;Description automatically generated">
+            <a:extLst>
+              <a:ext uri="{FF2B5EF4-FFF2-40B4-BE49-F238E27FC236}">
+                <a16:creationId xmlns:a16="http://schemas.microsoft.com/office/drawing/2014/main" id="{A9A4543B-F60B-CE24-7FA3-26B920E4CECD}"/>
+              </a:ext>
+            </a:extLst>
+          </p:cNvPr>
+          <p:cNvPicPr>
+            <a:picLocks noGrp="1" noChangeAspect="1"/>
+          </p:cNvPicPr>
+          <p:nvPr>
+            <p:ph idx="1"/>
+          </p:nvPr>
+        </p:nvPicPr>
+        <p:blipFill>
+          <a:blip r:embed="rId2"/>
+          <a:stretch>
+            <a:fillRect/>
+          </a:stretch>
+        </p:blipFill>
+        <p:spPr>
+          <a:xfrm>
+            <a:off x="838200" y="273812"/>
+            <a:ext cx="10515600" cy="3994214"/>
+          </a:xfrm>
+        </p:spPr>
+      </p:pic>
+      <p:grpSp>
+        <p:nvGrpSpPr>
+          <p:cNvPr id="6" name="Group 5">
+            <a:extLst>
+              <a:ext uri="{FF2B5EF4-FFF2-40B4-BE49-F238E27FC236}">
+                <a16:creationId xmlns:a16="http://schemas.microsoft.com/office/drawing/2014/main" id="{CF062DDF-856F-93C4-444C-AF2437A0C899}"/>
+              </a:ext>
+            </a:extLst>
+          </p:cNvPr>
+          <p:cNvGrpSpPr/>
+          <p:nvPr/>
+        </p:nvGrpSpPr>
+        <p:grpSpPr>
+          <a:xfrm>
+            <a:off x="1028700" y="1860169"/>
+            <a:ext cx="9277350" cy="4836045"/>
+            <a:chOff x="838200" y="1704594"/>
+            <a:chExt cx="9277350" cy="4836045"/>
+          </a:xfrm>
+        </p:grpSpPr>
+        <p:cxnSp>
+          <p:nvCxnSpPr>
+            <p:cNvPr id="7" name="Straight Arrow Connector 6">
+              <a:extLst>
+                <a:ext uri="{FF2B5EF4-FFF2-40B4-BE49-F238E27FC236}">
+                  <a16:creationId xmlns:a16="http://schemas.microsoft.com/office/drawing/2014/main" id="{600DFF5A-0C29-BA6A-5DD4-25BEEA3A7A2B}"/>
+                </a:ext>
+              </a:extLst>
+            </p:cNvPr>
+            <p:cNvCxnSpPr>
+              <a:cxnSpLocks/>
+            </p:cNvCxnSpPr>
+            <p:nvPr/>
+          </p:nvCxnSpPr>
+          <p:spPr>
+            <a:xfrm flipH="1">
+              <a:off x="6515100" y="2208975"/>
+              <a:ext cx="3200400" cy="2740850"/>
+            </a:xfrm>
+            <a:prstGeom prst="straightConnector1">
+              <a:avLst/>
+            </a:prstGeom>
+            <a:ln w="57150">
+              <a:tailEnd type="triangle"/>
+            </a:ln>
+          </p:spPr>
+          <p:style>
+            <a:lnRef idx="1">
+              <a:schemeClr val="accent1"/>
+            </a:lnRef>
+            <a:fillRef idx="0">
+              <a:schemeClr val="accent1"/>
+            </a:fillRef>
+            <a:effectRef idx="0">
+              <a:schemeClr val="accent1"/>
+            </a:effectRef>
+            <a:fontRef idx="minor">
+              <a:schemeClr val="tx1"/>
+            </a:fontRef>
+          </p:style>
+        </p:cxnSp>
+        <p:sp>
+          <p:nvSpPr>
+            <p:cNvPr id="8" name="Doughnut 7">
+              <a:extLst>
+                <a:ext uri="{FF2B5EF4-FFF2-40B4-BE49-F238E27FC236}">
+                  <a16:creationId xmlns:a16="http://schemas.microsoft.com/office/drawing/2014/main" id="{FCCFA71E-65F8-57C8-7E4A-86AB0F88C4A3}"/>
+                </a:ext>
+              </a:extLst>
+            </p:cNvPr>
+            <p:cNvSpPr/>
+            <p:nvPr/>
+          </p:nvSpPr>
+          <p:spPr>
+            <a:xfrm>
+              <a:off x="9715500" y="1704594"/>
+              <a:ext cx="400050" cy="711581"/>
+            </a:xfrm>
+            <a:prstGeom prst="donut">
+              <a:avLst>
+                <a:gd name="adj" fmla="val 6148"/>
+              </a:avLst>
+            </a:prstGeom>
+            <a:ln w="12700"/>
+          </p:spPr>
+          <p:style>
+            <a:lnRef idx="2">
+              <a:schemeClr val="accent1">
+                <a:shade val="50000"/>
+              </a:schemeClr>
+            </a:lnRef>
+            <a:fillRef idx="1">
+              <a:schemeClr val="accent1"/>
+            </a:fillRef>
+            <a:effectRef idx="0">
+              <a:schemeClr val="accent1"/>
+            </a:effectRef>
+            <a:fontRef idx="minor">
+              <a:schemeClr val="lt1"/>
+            </a:fontRef>
+          </p:style>
+          <p:txBody>
+            <a:bodyPr rtlCol="0" anchor="ctr"/>
+            <a:lstStyle/>
+            <a:p>
+              <a:pPr algn="ctr"/>
+              <a:endParaRPr lang="en-US">
+                <a:solidFill>
+                  <a:schemeClr val="tx1"/>
+                </a:solidFill>
+              </a:endParaRPr>
+            </a:p>
+          </p:txBody>
+        </p:sp>
+        <p:sp>
+          <p:nvSpPr>
+            <p:cNvPr id="9" name="TextBox 8">
+              <a:extLst>
+                <a:ext uri="{FF2B5EF4-FFF2-40B4-BE49-F238E27FC236}">
+                  <a16:creationId xmlns:a16="http://schemas.microsoft.com/office/drawing/2014/main" id="{90B7BB8A-17FF-F1E3-5157-2FB3B5B5EBDC}"/>
+                </a:ext>
+              </a:extLst>
+            </p:cNvPr>
+            <p:cNvSpPr txBox="1"/>
+            <p:nvPr/>
+          </p:nvSpPr>
+          <p:spPr>
+            <a:xfrm>
+              <a:off x="838200" y="4786313"/>
+              <a:ext cx="8267700" cy="1754326"/>
+            </a:xfrm>
+            <a:prstGeom prst="rect">
+              <a:avLst/>
+            </a:prstGeom>
+            <a:noFill/>
+          </p:spPr>
+          <p:txBody>
+            <a:bodyPr wrap="square" rtlCol="0">
+              <a:spAutoFit/>
+            </a:bodyPr>
+            <a:lstStyle/>
+            <a:p>
+              <a:r>
+                <a:rPr lang="en-US" sz="3600" dirty="0"/>
+                <a:t>Breakpoint: This button executes one line of code at a time.  Useful to check if each step is doing what you expect</a:t>
+              </a:r>
+            </a:p>
+          </p:txBody>
+        </p:sp>
+      </p:grpSp>
+    </p:spTree>
+    <p:extLst>
+      <p:ext uri="{BB962C8B-B14F-4D97-AF65-F5344CB8AC3E}">
+        <p14:creationId xmlns:p14="http://schemas.microsoft.com/office/powerpoint/2010/main" val="982031194"/>
+      </p:ext>
+    </p:extLst>
+  </p:cSld>
+  <p:clrMapOvr>
+    <a:masterClrMapping/>
+  </p:clrMapOvr>
+  <p:timing>
+    <p:tnLst>
+      <p:par>
+        <p:cTn id="1" dur="indefinite" restart="never" nodeType="tmRoot">
+          <p:childTnLst>
+            <p:seq concurrent="1" nextAc="seek">
+              <p:cTn id="2" dur="indefinite" nodeType="mainSeq">
+                <p:childTnLst>
+                  <p:par>
+                    <p:cTn id="3" fill="hold">
+                      <p:stCondLst>
+                        <p:cond delay="indefinite"/>
+                      </p:stCondLst>
+                      <p:childTnLst>
+                        <p:par>
+                          <p:cTn id="4" fill="hold">
+                            <p:stCondLst>
+                              <p:cond delay="0"/>
+                            </p:stCondLst>
+                            <p:childTnLst>
+                              <p:par>
+                                <p:cTn id="5" presetID="1" presetClass="entr" presetSubtype="0" fill="hold" nodeType="clickEffect">
+                                  <p:stCondLst>
+                                    <p:cond delay="0"/>
+                                  </p:stCondLst>
+                                  <p:childTnLst>
+                                    <p:set>
+                                      <p:cBhvr>
+                                        <p:cTn id="6" dur="1" fill="hold">
+                                          <p:stCondLst>
+                                            <p:cond delay="0"/>
+                                          </p:stCondLst>
+                                        </p:cTn>
+                                        <p:tgtEl>
+                                          <p:spTgt spid="6"/>
+                                        </p:tgtEl>
+                                        <p:attrNameLst>
+                                          <p:attrName>style.visibility</p:attrName>
+                                        </p:attrNameLst>
+                                      </p:cBhvr>
+                                      <p:to>
+                                        <p:strVal val="visible"/>
+                                      </p:to>
+                                    </p:set>
+                                  </p:childTnLst>
+                                </p:cTn>
+                              </p:par>
+                            </p:childTnLst>
+                          </p:cTn>
+                        </p:par>
+                      </p:childTnLst>
+                    </p:cTn>
+                  </p:par>
+                  <p:par>
+                    <p:cTn id="7" fill="hold">
+                      <p:stCondLst>
+                        <p:cond delay="indefinite"/>
+                      </p:stCondLst>
+                      <p:childTnLst>
+                        <p:par>
+                          <p:cTn id="8" fill="hold">
+                            <p:stCondLst>
+                              <p:cond delay="0"/>
+                            </p:stCondLst>
+                            <p:childTnLst>
+                              <p:par>
+                                <p:cTn id="9" presetID="1" presetClass="entr" presetSubtype="0" fill="hold" nodeType="clickEffect">
+                                  <p:stCondLst>
+                                    <p:cond delay="0"/>
+                                  </p:stCondLst>
+                                  <p:childTnLst>
+                                    <p:set>
+                                      <p:cBhvr>
+                                        <p:cTn id="10" dur="1" fill="hold">
+                                          <p:stCondLst>
+                                            <p:cond delay="0"/>
+                                          </p:stCondLst>
+                                        </p:cTn>
+                                        <p:tgtEl>
+                                          <p:spTgt spid="6"/>
+                                        </p:tgtEl>
+                                        <p:attrNameLst>
+                                          <p:attrName>style.visibility</p:attrName>
+                                        </p:attrNameLst>
+                                      </p:cBhvr>
+                                      <p:to>
+                                        <p:strVal val="visible"/>
+                                      </p:to>
+                                    </p:set>
+                                  </p:childTnLst>
+                                </p:cTn>
+                              </p:par>
+                            </p:childTnLst>
+                          </p:cTn>
+                        </p:par>
+                      </p:childTnLst>
+                    </p:cTn>
+                  </p:par>
+                </p:childTnLst>
+              </p:cTn>
+              <p:prevCondLst>
+                <p:cond evt="onPrev" delay="0">
+                  <p:tgtEl>
+                    <p:sldTgt/>
+                  </p:tgtEl>
+                </p:cond>
+              </p:prevCondLst>
+              <p:nextCondLst>
+                <p:cond evt="onNext" delay="0">
+                  <p:tgtEl>
+                    <p:sldTgt/>
+                  </p:tgtEl>
+                </p:cond>
+              </p:nextCondLst>
+            </p:seq>
+          </p:childTnLst>
+        </p:cTn>
+      </p:par>
+    </p:tnLst>
+  </p:timing>
+</p:sld>
+</file>
+
+<file path=ppt/slides/slide16.xml><?xml version="1.0" encoding="utf-8"?>
+<p:sld xmlns:a="http://schemas.openxmlformats.org/drawingml/2006/main" xmlns:r="http://schemas.openxmlformats.org/officeDocument/2006/relationships" xmlns:p="http://schemas.openxmlformats.org/presentationml/2006/main">
+  <p:cSld>
+    <p:spTree>
+      <p:nvGrpSpPr>
+        <p:cNvPr id="1" name=""/>
+        <p:cNvGrpSpPr/>
+        <p:nvPr/>
+      </p:nvGrpSpPr>
+      <p:grpSpPr>
+        <a:xfrm>
+          <a:off x="0" y="0"/>
+          <a:ext cx="0" cy="0"/>
+          <a:chOff x="0" y="0"/>
+          <a:chExt cx="0" cy="0"/>
+        </a:xfrm>
+      </p:grpSpPr>
+      <p:sp>
+        <p:nvSpPr>
+          <p:cNvPr id="2" name="Title 1">
+            <a:extLst>
+              <a:ext uri="{FF2B5EF4-FFF2-40B4-BE49-F238E27FC236}">
+                <a16:creationId xmlns:a16="http://schemas.microsoft.com/office/drawing/2014/main" id="{66D9E06A-E4A3-7942-B436-E71CD3E153C9}"/>
+              </a:ext>
+            </a:extLst>
+          </p:cNvPr>
+          <p:cNvSpPr>
+            <a:spLocks noGrp="1"/>
+          </p:cNvSpPr>
+          <p:nvPr>
+            <p:ph type="title"/>
+          </p:nvPr>
+        </p:nvSpPr>
+        <p:spPr/>
+        <p:txBody>
+          <a:bodyPr/>
+          <a:lstStyle/>
+          <a:p>
+            <a:r>
+              <a:rPr lang="en-GB" dirty="0"/>
+              <a:t>Change One Thing at a Time, For a Reason</a:t>
+            </a:r>
+            <a:br>
+              <a:rPr lang="en-GB" dirty="0"/>
+            </a:br>
+            <a:endParaRPr lang="en-US" dirty="0"/>
+          </a:p>
+        </p:txBody>
+      </p:sp>
+      <p:sp>
+        <p:nvSpPr>
+          <p:cNvPr id="3" name="Content Placeholder 2">
+            <a:extLst>
+              <a:ext uri="{FF2B5EF4-FFF2-40B4-BE49-F238E27FC236}">
+                <a16:creationId xmlns:a16="http://schemas.microsoft.com/office/drawing/2014/main" id="{ED89CA62-A21E-3A40-9750-C7371CD44AFA}"/>
+              </a:ext>
+            </a:extLst>
+          </p:cNvPr>
+          <p:cNvSpPr>
+            <a:spLocks noGrp="1"/>
+          </p:cNvSpPr>
+          <p:nvPr>
+            <p:ph idx="1"/>
+          </p:nvPr>
+        </p:nvSpPr>
+        <p:spPr/>
+        <p:txBody>
+          <a:bodyPr>
+            <a:normAutofit lnSpcReduction="10000"/>
+          </a:bodyPr>
+          <a:lstStyle/>
+          <a:p>
+            <a:r>
+              <a:rPr lang="en-GB" dirty="0"/>
+              <a:t>Replacing random chunks of code is unlikely to do much good.</a:t>
+            </a:r>
+          </a:p>
+          <a:p>
+            <a:pPr lvl="1"/>
+            <a:r>
+              <a:rPr lang="en-GB" dirty="0"/>
+              <a:t> (After all, if you got it wrong the first time, you’ll probably get it wrong the second and third as well.)</a:t>
+            </a:r>
+          </a:p>
+          <a:p>
+            <a:r>
+              <a:rPr lang="en-GB" dirty="0"/>
+              <a:t>Make changes for a Reason.  Either to:</a:t>
+            </a:r>
+          </a:p>
+          <a:p>
+            <a:pPr lvl="1"/>
+            <a:r>
+              <a:rPr lang="en-GB" dirty="0"/>
+              <a:t>Gather more information (e.g. is bug still here if I do X)</a:t>
+            </a:r>
+          </a:p>
+          <a:p>
+            <a:pPr lvl="1"/>
+            <a:r>
+              <a:rPr lang="en-GB" dirty="0"/>
+              <a:t>Test a potential fix</a:t>
+            </a:r>
+          </a:p>
+          <a:p>
+            <a:endParaRPr lang="en-GB" dirty="0"/>
+          </a:p>
+          <a:p>
+            <a:r>
+              <a:rPr lang="en-GB" dirty="0"/>
+              <a:t>Use test inputs (e.g. smaller/simpler things)</a:t>
+            </a:r>
+          </a:p>
+          <a:p>
+            <a:endParaRPr lang="en-GB" dirty="0"/>
+          </a:p>
+          <a:p>
+            <a:r>
+              <a:rPr lang="en-GB" dirty="0"/>
+              <a:t>Use breakpoints to inspect what your code is doing</a:t>
+            </a:r>
+          </a:p>
+          <a:p>
+            <a:pPr lvl="1"/>
+            <a:endParaRPr lang="en-GB" dirty="0"/>
+          </a:p>
+          <a:p>
+            <a:endParaRPr lang="en-US" dirty="0"/>
+          </a:p>
+        </p:txBody>
+      </p:sp>
+    </p:spTree>
+    <p:extLst>
+      <p:ext uri="{BB962C8B-B14F-4D97-AF65-F5344CB8AC3E}">
+        <p14:creationId xmlns:p14="http://schemas.microsoft.com/office/powerpoint/2010/main" val="2485514461"/>
+      </p:ext>
+    </p:extLst>
+  </p:cSld>
+  <p:clrMapOvr>
+    <a:masterClrMapping/>
+  </p:clrMapOvr>
+</p:sld>
+</file>
+
+<file path=ppt/slides/slide17.xml><?xml version="1.0" encoding="utf-8"?>
+<p:sld xmlns:a="http://schemas.openxmlformats.org/drawingml/2006/main" xmlns:r="http://schemas.openxmlformats.org/officeDocument/2006/relationships" xmlns:p="http://schemas.openxmlformats.org/presentationml/2006/main">
+  <p:cSld>
+    <p:spTree>
+      <p:nvGrpSpPr>
+        <p:cNvPr id="1" name=""/>
+        <p:cNvGrpSpPr/>
+        <p:nvPr/>
+      </p:nvGrpSpPr>
+      <p:grpSpPr>
+        <a:xfrm>
+          <a:off x="0" y="0"/>
+          <a:ext cx="0" cy="0"/>
+          <a:chOff x="0" y="0"/>
+          <a:chExt cx="0" cy="0"/>
+        </a:xfrm>
+      </p:grpSpPr>
+      <p:sp>
+        <p:nvSpPr>
+          <p:cNvPr id="2" name="Title 1">
+            <a:extLst>
+              <a:ext uri="{FF2B5EF4-FFF2-40B4-BE49-F238E27FC236}">
                 <a16:creationId xmlns:a16="http://schemas.microsoft.com/office/drawing/2014/main" id="{48708B6F-1B02-7A46-A79E-5A91AE93C9BD}"/>
               </a:ext>
             </a:extLst>
@@ -4141,7 +5213,7 @@
 </p:sld>
 </file>
 
-<file path=ppt/slides/slide15.xml><?xml version="1.0" encoding="utf-8"?>
+<file path=ppt/slides/slide18.xml><?xml version="1.0" encoding="utf-8"?>
 <p:sld xmlns:a="http://schemas.openxmlformats.org/drawingml/2006/main" xmlns:r="http://schemas.openxmlformats.org/officeDocument/2006/relationships" xmlns:p="http://schemas.openxmlformats.org/presentationml/2006/main">
   <p:cSld>
     <p:spTree>
@@ -4233,7 +5305,7 @@
 </p:sld>
 </file>
 
-<file path=ppt/slides/slide16.xml><?xml version="1.0" encoding="utf-8"?>
+<file path=ppt/slides/slide19.xml><?xml version="1.0" encoding="utf-8"?>
 <p:sld xmlns:a="http://schemas.openxmlformats.org/drawingml/2006/main" xmlns:r="http://schemas.openxmlformats.org/officeDocument/2006/relationships" xmlns:p="http://schemas.openxmlformats.org/presentationml/2006/main">
   <p:cSld>
     <p:spTree>
@@ -4493,620 +5565,6 @@
     <p:extLst>
       <p:ext uri="{BB962C8B-B14F-4D97-AF65-F5344CB8AC3E}">
         <p14:creationId xmlns:p14="http://schemas.microsoft.com/office/powerpoint/2010/main" val="3843946010"/>
-      </p:ext>
-    </p:extLst>
-  </p:cSld>
-  <p:clrMapOvr>
-    <a:masterClrMapping/>
-  </p:clrMapOvr>
-</p:sld>
-</file>
-
-<file path=ppt/slides/slide17.xml><?xml version="1.0" encoding="utf-8"?>
-<p:sld xmlns:a="http://schemas.openxmlformats.org/drawingml/2006/main" xmlns:r="http://schemas.openxmlformats.org/officeDocument/2006/relationships" xmlns:p="http://schemas.openxmlformats.org/presentationml/2006/main">
-  <p:cSld>
-    <p:spTree>
-      <p:nvGrpSpPr>
-        <p:cNvPr id="1" name=""/>
-        <p:cNvGrpSpPr/>
-        <p:nvPr/>
-      </p:nvGrpSpPr>
-      <p:grpSpPr>
-        <a:xfrm>
-          <a:off x="0" y="0"/>
-          <a:ext cx="0" cy="0"/>
-          <a:chOff x="0" y="0"/>
-          <a:chExt cx="0" cy="0"/>
-        </a:xfrm>
-      </p:grpSpPr>
-      <p:sp>
-        <p:nvSpPr>
-          <p:cNvPr id="2" name="Title 1">
-            <a:extLst>
-              <a:ext uri="{FF2B5EF4-FFF2-40B4-BE49-F238E27FC236}">
-                <a16:creationId xmlns:a16="http://schemas.microsoft.com/office/drawing/2014/main" id="{48708B6F-1B02-7A46-A79E-5A91AE93C9BD}"/>
-              </a:ext>
-            </a:extLst>
-          </p:cNvPr>
-          <p:cNvSpPr>
-            <a:spLocks noGrp="1"/>
-          </p:cNvSpPr>
-          <p:nvPr>
-            <p:ph type="title"/>
-          </p:nvPr>
-        </p:nvSpPr>
-        <p:spPr/>
-        <p:txBody>
-          <a:bodyPr/>
-          <a:lstStyle/>
-          <a:p>
-            <a:r>
-              <a:rPr lang="en-GB" dirty="0"/>
-              <a:t>Don’t be scared to read the traceback</a:t>
-            </a:r>
-            <a:br>
-              <a:rPr lang="en-GB" dirty="0"/>
-            </a:br>
-            <a:endParaRPr lang="en-US" dirty="0"/>
-          </a:p>
-        </p:txBody>
-      </p:sp>
-      <p:pic>
-        <p:nvPicPr>
-          <p:cNvPr id="5" name="Picture 4" descr="A picture containing diagram&#10;&#10;Description automatically generated">
-            <a:extLst>
-              <a:ext uri="{FF2B5EF4-FFF2-40B4-BE49-F238E27FC236}">
-                <a16:creationId xmlns:a16="http://schemas.microsoft.com/office/drawing/2014/main" id="{95C9E785-CECA-1E4B-9155-739AA390EB4F}"/>
-              </a:ext>
-            </a:extLst>
-          </p:cNvPr>
-          <p:cNvPicPr>
-            <a:picLocks noChangeAspect="1"/>
-          </p:cNvPicPr>
-          <p:nvPr/>
-        </p:nvPicPr>
-        <p:blipFill>
-          <a:blip r:embed="rId2"/>
-          <a:stretch>
-            <a:fillRect/>
-          </a:stretch>
-        </p:blipFill>
-        <p:spPr>
-          <a:xfrm>
-            <a:off x="0" y="1690688"/>
-            <a:ext cx="12834905" cy="2664958"/>
-          </a:xfrm>
-          <a:prstGeom prst="rect">
-            <a:avLst/>
-          </a:prstGeom>
-        </p:spPr>
-      </p:pic>
-      <p:sp>
-        <p:nvSpPr>
-          <p:cNvPr id="3" name="Up Arrow 2">
-            <a:extLst>
-              <a:ext uri="{FF2B5EF4-FFF2-40B4-BE49-F238E27FC236}">
-                <a16:creationId xmlns:a16="http://schemas.microsoft.com/office/drawing/2014/main" id="{69684A8A-AD1A-D142-B13E-4F1808AD09F3}"/>
-              </a:ext>
-            </a:extLst>
-          </p:cNvPr>
-          <p:cNvSpPr/>
-          <p:nvPr/>
-        </p:nvSpPr>
-        <p:spPr>
-          <a:xfrm>
-            <a:off x="502920" y="4355646"/>
-            <a:ext cx="502920" cy="811666"/>
-          </a:xfrm>
-          <a:prstGeom prst="upArrow">
-            <a:avLst/>
-          </a:prstGeom>
-        </p:spPr>
-        <p:style>
-          <a:lnRef idx="2">
-            <a:schemeClr val="accent1">
-              <a:shade val="50000"/>
-            </a:schemeClr>
-          </a:lnRef>
-          <a:fillRef idx="1">
-            <a:schemeClr val="accent1"/>
-          </a:fillRef>
-          <a:effectRef idx="0">
-            <a:schemeClr val="accent1"/>
-          </a:effectRef>
-          <a:fontRef idx="minor">
-            <a:schemeClr val="lt1"/>
-          </a:fontRef>
-        </p:style>
-        <p:txBody>
-          <a:bodyPr rtlCol="0" anchor="ctr"/>
-          <a:lstStyle/>
-          <a:p>
-            <a:pPr algn="ctr"/>
-            <a:endParaRPr lang="en-US"/>
-          </a:p>
-        </p:txBody>
-      </p:sp>
-      <p:sp>
-        <p:nvSpPr>
-          <p:cNvPr id="4" name="TextBox 3">
-            <a:extLst>
-              <a:ext uri="{FF2B5EF4-FFF2-40B4-BE49-F238E27FC236}">
-                <a16:creationId xmlns:a16="http://schemas.microsoft.com/office/drawing/2014/main" id="{913747A6-C2DE-4C40-AFD2-D0C9C2ABC088}"/>
-              </a:ext>
-            </a:extLst>
-          </p:cNvPr>
-          <p:cNvSpPr txBox="1"/>
-          <p:nvPr/>
-        </p:nvSpPr>
-        <p:spPr>
-          <a:xfrm>
-            <a:off x="0" y="5358043"/>
-            <a:ext cx="2604046" cy="646331"/>
-          </a:xfrm>
-          <a:prstGeom prst="rect">
-            <a:avLst/>
-          </a:prstGeom>
-          <a:noFill/>
-        </p:spPr>
-        <p:txBody>
-          <a:bodyPr wrap="none" rtlCol="0">
-            <a:spAutoFit/>
-          </a:bodyPr>
-          <a:lstStyle/>
-          <a:p>
-            <a:r>
-              <a:rPr lang="en-US" sz="3600" dirty="0"/>
-              <a:t>Type of Error</a:t>
-            </a:r>
-          </a:p>
-        </p:txBody>
-      </p:sp>
-      <p:sp>
-        <p:nvSpPr>
-          <p:cNvPr id="7" name="Oval 6">
-            <a:extLst>
-              <a:ext uri="{FF2B5EF4-FFF2-40B4-BE49-F238E27FC236}">
-                <a16:creationId xmlns:a16="http://schemas.microsoft.com/office/drawing/2014/main" id="{34E3D88A-1465-9947-B82D-DFF8E0B1AC59}"/>
-              </a:ext>
-            </a:extLst>
-          </p:cNvPr>
-          <p:cNvSpPr/>
-          <p:nvPr/>
-        </p:nvSpPr>
-        <p:spPr>
-          <a:xfrm>
-            <a:off x="1814052" y="3674219"/>
-            <a:ext cx="6386051" cy="811665"/>
-          </a:xfrm>
-          <a:prstGeom prst="ellipse">
-            <a:avLst/>
-          </a:prstGeom>
-          <a:noFill/>
-          <a:ln w="57150"/>
-        </p:spPr>
-        <p:style>
-          <a:lnRef idx="2">
-            <a:schemeClr val="accent1">
-              <a:shade val="50000"/>
-            </a:schemeClr>
-          </a:lnRef>
-          <a:fillRef idx="1">
-            <a:schemeClr val="accent1"/>
-          </a:fillRef>
-          <a:effectRef idx="0">
-            <a:schemeClr val="accent1"/>
-          </a:effectRef>
-          <a:fontRef idx="minor">
-            <a:schemeClr val="lt1"/>
-          </a:fontRef>
-        </p:style>
-        <p:txBody>
-          <a:bodyPr rtlCol="0" anchor="ctr"/>
-          <a:lstStyle/>
-          <a:p>
-            <a:pPr algn="ctr"/>
-            <a:endParaRPr lang="en-US"/>
-          </a:p>
-        </p:txBody>
-      </p:sp>
-      <p:cxnSp>
-        <p:nvCxnSpPr>
-          <p:cNvPr id="10" name="Straight Arrow Connector 9">
-            <a:extLst>
-              <a:ext uri="{FF2B5EF4-FFF2-40B4-BE49-F238E27FC236}">
-                <a16:creationId xmlns:a16="http://schemas.microsoft.com/office/drawing/2014/main" id="{E6054474-D2F3-8949-864F-15A65F22B966}"/>
-              </a:ext>
-            </a:extLst>
-          </p:cNvPr>
-          <p:cNvCxnSpPr>
-            <a:cxnSpLocks/>
-          </p:cNvCxnSpPr>
-          <p:nvPr/>
-        </p:nvCxnSpPr>
-        <p:spPr>
-          <a:xfrm flipH="1" flipV="1">
-            <a:off x="5412659" y="4546378"/>
-            <a:ext cx="943896" cy="497066"/>
-          </a:xfrm>
-          <a:prstGeom prst="straightConnector1">
-            <a:avLst/>
-          </a:prstGeom>
-          <a:ln w="76200">
-            <a:tailEnd type="triangle"/>
-          </a:ln>
-        </p:spPr>
-        <p:style>
-          <a:lnRef idx="1">
-            <a:schemeClr val="accent1"/>
-          </a:lnRef>
-          <a:fillRef idx="0">
-            <a:schemeClr val="accent1"/>
-          </a:fillRef>
-          <a:effectRef idx="0">
-            <a:schemeClr val="accent1"/>
-          </a:effectRef>
-          <a:fontRef idx="minor">
-            <a:schemeClr val="tx1"/>
-          </a:fontRef>
-        </p:style>
-      </p:cxnSp>
-      <p:sp>
-        <p:nvSpPr>
-          <p:cNvPr id="12" name="TextBox 11">
-            <a:extLst>
-              <a:ext uri="{FF2B5EF4-FFF2-40B4-BE49-F238E27FC236}">
-                <a16:creationId xmlns:a16="http://schemas.microsoft.com/office/drawing/2014/main" id="{6BD9A0A3-C2A3-4E45-AF34-5FB46212CBC0}"/>
-              </a:ext>
-            </a:extLst>
-          </p:cNvPr>
-          <p:cNvSpPr txBox="1"/>
-          <p:nvPr/>
-        </p:nvSpPr>
-        <p:spPr>
-          <a:xfrm>
-            <a:off x="6597446" y="4844146"/>
-            <a:ext cx="2856808" cy="646331"/>
-          </a:xfrm>
-          <a:prstGeom prst="rect">
-            <a:avLst/>
-          </a:prstGeom>
-          <a:noFill/>
-        </p:spPr>
-        <p:txBody>
-          <a:bodyPr wrap="none" rtlCol="0">
-            <a:spAutoFit/>
-          </a:bodyPr>
-          <a:lstStyle/>
-          <a:p>
-            <a:r>
-              <a:rPr lang="en-US" sz="3600" dirty="0"/>
-              <a:t>Error message</a:t>
-            </a:r>
-          </a:p>
-        </p:txBody>
-      </p:sp>
-    </p:spTree>
-    <p:extLst>
-      <p:ext uri="{BB962C8B-B14F-4D97-AF65-F5344CB8AC3E}">
-        <p14:creationId xmlns:p14="http://schemas.microsoft.com/office/powerpoint/2010/main" val="1779095242"/>
-      </p:ext>
-    </p:extLst>
-  </p:cSld>
-  <p:clrMapOvr>
-    <a:masterClrMapping/>
-  </p:clrMapOvr>
-</p:sld>
-</file>
-
-<file path=ppt/slides/slide18.xml><?xml version="1.0" encoding="utf-8"?>
-<p:sld xmlns:a="http://schemas.openxmlformats.org/drawingml/2006/main" xmlns:r="http://schemas.openxmlformats.org/officeDocument/2006/relationships" xmlns:p="http://schemas.openxmlformats.org/presentationml/2006/main">
-  <p:cSld>
-    <p:spTree>
-      <p:nvGrpSpPr>
-        <p:cNvPr id="1" name=""/>
-        <p:cNvGrpSpPr/>
-        <p:nvPr/>
-      </p:nvGrpSpPr>
-      <p:grpSpPr>
-        <a:xfrm>
-          <a:off x="0" y="0"/>
-          <a:ext cx="0" cy="0"/>
-          <a:chOff x="0" y="0"/>
-          <a:chExt cx="0" cy="0"/>
-        </a:xfrm>
-      </p:grpSpPr>
-      <p:sp>
-        <p:nvSpPr>
-          <p:cNvPr id="2" name="Title 1">
-            <a:extLst>
-              <a:ext uri="{FF2B5EF4-FFF2-40B4-BE49-F238E27FC236}">
-                <a16:creationId xmlns:a16="http://schemas.microsoft.com/office/drawing/2014/main" id="{48708B6F-1B02-7A46-A79E-5A91AE93C9BD}"/>
-              </a:ext>
-            </a:extLst>
-          </p:cNvPr>
-          <p:cNvSpPr>
-            <a:spLocks noGrp="1"/>
-          </p:cNvSpPr>
-          <p:nvPr>
-            <p:ph type="title"/>
-          </p:nvPr>
-        </p:nvSpPr>
-        <p:spPr/>
-        <p:txBody>
-          <a:bodyPr/>
-          <a:lstStyle/>
-          <a:p>
-            <a:r>
-              <a:rPr lang="en-GB" dirty="0"/>
-              <a:t>Don’t be scared to read the traceback</a:t>
-            </a:r>
-            <a:br>
-              <a:rPr lang="en-GB" dirty="0"/>
-            </a:br>
-            <a:endParaRPr lang="en-US" dirty="0"/>
-          </a:p>
-        </p:txBody>
-      </p:sp>
-      <p:pic>
-        <p:nvPicPr>
-          <p:cNvPr id="5" name="Picture 4" descr="A picture containing diagram&#10;&#10;Description automatically generated">
-            <a:extLst>
-              <a:ext uri="{FF2B5EF4-FFF2-40B4-BE49-F238E27FC236}">
-                <a16:creationId xmlns:a16="http://schemas.microsoft.com/office/drawing/2014/main" id="{95C9E785-CECA-1E4B-9155-739AA390EB4F}"/>
-              </a:ext>
-            </a:extLst>
-          </p:cNvPr>
-          <p:cNvPicPr>
-            <a:picLocks noChangeAspect="1"/>
-          </p:cNvPicPr>
-          <p:nvPr/>
-        </p:nvPicPr>
-        <p:blipFill>
-          <a:blip r:embed="rId2"/>
-          <a:stretch>
-            <a:fillRect/>
-          </a:stretch>
-        </p:blipFill>
-        <p:spPr>
-          <a:xfrm>
-            <a:off x="0" y="1690688"/>
-            <a:ext cx="12834905" cy="2664958"/>
-          </a:xfrm>
-          <a:prstGeom prst="rect">
-            <a:avLst/>
-          </a:prstGeom>
-        </p:spPr>
-      </p:pic>
-      <p:sp>
-        <p:nvSpPr>
-          <p:cNvPr id="3" name="Rectangle 2">
-            <a:extLst>
-              <a:ext uri="{FF2B5EF4-FFF2-40B4-BE49-F238E27FC236}">
-                <a16:creationId xmlns:a16="http://schemas.microsoft.com/office/drawing/2014/main" id="{CC60FFFE-B3AD-044A-B77B-C1FDB4B43614}"/>
-              </a:ext>
-            </a:extLst>
-          </p:cNvPr>
-          <p:cNvSpPr/>
-          <p:nvPr/>
-        </p:nvSpPr>
-        <p:spPr>
-          <a:xfrm>
-            <a:off x="838200" y="4738549"/>
-            <a:ext cx="9818908" cy="1754326"/>
-          </a:xfrm>
-          <a:prstGeom prst="rect">
-            <a:avLst/>
-          </a:prstGeom>
-        </p:spPr>
-        <p:txBody>
-          <a:bodyPr wrap="square">
-            <a:spAutoFit/>
-          </a:bodyPr>
-          <a:lstStyle/>
-          <a:p>
-            <a:r>
-              <a:rPr lang="en-US" sz="3600" dirty="0" err="1"/>
-              <a:t>RealPython</a:t>
-            </a:r>
-            <a:r>
-              <a:rPr lang="en-US" sz="3600" dirty="0"/>
-              <a:t> website has nice explanations of what each error type means:</a:t>
-            </a:r>
-          </a:p>
-          <a:p>
-            <a:r>
-              <a:rPr lang="en-US" sz="3600" dirty="0"/>
-              <a:t>https://</a:t>
-            </a:r>
-            <a:r>
-              <a:rPr lang="en-US" sz="3600" dirty="0" err="1"/>
-              <a:t>realpython.com</a:t>
-            </a:r>
-            <a:r>
-              <a:rPr lang="en-US" sz="3600" dirty="0"/>
-              <a:t>/python-traceback/</a:t>
-            </a:r>
-          </a:p>
-        </p:txBody>
-      </p:sp>
-    </p:spTree>
-    <p:extLst>
-      <p:ext uri="{BB962C8B-B14F-4D97-AF65-F5344CB8AC3E}">
-        <p14:creationId xmlns:p14="http://schemas.microsoft.com/office/powerpoint/2010/main" val="4048530283"/>
-      </p:ext>
-    </p:extLst>
-  </p:cSld>
-  <p:clrMapOvr>
-    <a:masterClrMapping/>
-  </p:clrMapOvr>
-</p:sld>
-</file>
-
-<file path=ppt/slides/slide19.xml><?xml version="1.0" encoding="utf-8"?>
-<p:sld xmlns:a="http://schemas.openxmlformats.org/drawingml/2006/main" xmlns:r="http://schemas.openxmlformats.org/officeDocument/2006/relationships" xmlns:p="http://schemas.openxmlformats.org/presentationml/2006/main">
-  <p:cSld>
-    <p:spTree>
-      <p:nvGrpSpPr>
-        <p:cNvPr id="1" name=""/>
-        <p:cNvGrpSpPr/>
-        <p:nvPr/>
-      </p:nvGrpSpPr>
-      <p:grpSpPr>
-        <a:xfrm>
-          <a:off x="0" y="0"/>
-          <a:ext cx="0" cy="0"/>
-          <a:chOff x="0" y="0"/>
-          <a:chExt cx="0" cy="0"/>
-        </a:xfrm>
-      </p:grpSpPr>
-      <p:sp>
-        <p:nvSpPr>
-          <p:cNvPr id="2" name="Title 1">
-            <a:extLst>
-              <a:ext uri="{FF2B5EF4-FFF2-40B4-BE49-F238E27FC236}">
-                <a16:creationId xmlns:a16="http://schemas.microsoft.com/office/drawing/2014/main" id="{4B68D123-7163-B9F9-F1D2-969BF73BBFB1}"/>
-              </a:ext>
-            </a:extLst>
-          </p:cNvPr>
-          <p:cNvSpPr>
-            <a:spLocks noGrp="1"/>
-          </p:cNvSpPr>
-          <p:nvPr>
-            <p:ph type="title"/>
-          </p:nvPr>
-        </p:nvSpPr>
-        <p:spPr>
-          <a:xfrm>
-            <a:off x="630382" y="-85726"/>
-            <a:ext cx="10515600" cy="1325563"/>
-          </a:xfrm>
-        </p:spPr>
-        <p:txBody>
-          <a:bodyPr/>
-          <a:lstStyle/>
-          <a:p>
-            <a:r>
-              <a:rPr lang="en-US" dirty="0"/>
-              <a:t>Rubber Duck Debugging</a:t>
-            </a:r>
-          </a:p>
-        </p:txBody>
-      </p:sp>
-      <p:sp>
-        <p:nvSpPr>
-          <p:cNvPr id="3" name="Content Placeholder 2">
-            <a:extLst>
-              <a:ext uri="{FF2B5EF4-FFF2-40B4-BE49-F238E27FC236}">
-                <a16:creationId xmlns:a16="http://schemas.microsoft.com/office/drawing/2014/main" id="{DABF208C-58B9-2FD7-034D-85CD3F94FD99}"/>
-              </a:ext>
-            </a:extLst>
-          </p:cNvPr>
-          <p:cNvSpPr>
-            <a:spLocks noGrp="1"/>
-          </p:cNvSpPr>
-          <p:nvPr>
-            <p:ph idx="1"/>
-          </p:nvPr>
-        </p:nvSpPr>
-        <p:spPr>
-          <a:xfrm>
-            <a:off x="553985" y="1581784"/>
-            <a:ext cx="5877295" cy="4361815"/>
-          </a:xfrm>
-        </p:spPr>
-        <p:txBody>
-          <a:bodyPr>
-            <a:normAutofit fontScale="92500" lnSpcReduction="20000"/>
-          </a:bodyPr>
-          <a:lstStyle/>
-          <a:p>
-            <a:pPr marL="514350" indent="-514350" algn="l" fontAlgn="base">
-              <a:buFont typeface="+mj-lt"/>
-              <a:buAutoNum type="arabicParenR"/>
-            </a:pPr>
-            <a:r>
-              <a:rPr lang="en-GB" u="none" strike="noStrike" dirty="0">
-                <a:effectLst/>
-              </a:rPr>
-              <a:t>Place rubber duck on desk and inform it you are just going to go over some code with it, if that’s all right.</a:t>
-            </a:r>
-          </a:p>
-          <a:p>
-            <a:pPr marL="514350" indent="-514350" algn="l" fontAlgn="base">
-              <a:buFont typeface="+mj-lt"/>
-              <a:buAutoNum type="arabicParenR"/>
-            </a:pPr>
-            <a:r>
-              <a:rPr lang="en-GB" u="none" strike="noStrike" dirty="0">
-                <a:effectLst/>
-              </a:rPr>
-              <a:t>Explain to the duck what your code is supposed to do, and then go into detail and explain your code line by line.</a:t>
-            </a:r>
-          </a:p>
-          <a:p>
-            <a:pPr marL="514350" indent="-514350" algn="l" fontAlgn="base">
-              <a:buFont typeface="+mj-lt"/>
-              <a:buAutoNum type="arabicParenR"/>
-            </a:pPr>
-            <a:r>
-              <a:rPr lang="en-GB" u="none" strike="noStrike" dirty="0">
-                <a:effectLst/>
-              </a:rPr>
-              <a:t>At some point you will tell the duck what you are doing next and then realise that that is not in fact what you are actually doing. The duck will sit there serenely, happy in the knowledge that it has helped you on your way.</a:t>
-            </a:r>
-          </a:p>
-        </p:txBody>
-      </p:sp>
-      <p:pic>
-        <p:nvPicPr>
-          <p:cNvPr id="1028" name="Picture 4" descr="Rubber Duck Debugging. Wheres my rubber duck!? | by Kelly Dobbins | Medium">
-            <a:extLst>
-              <a:ext uri="{FF2B5EF4-FFF2-40B4-BE49-F238E27FC236}">
-                <a16:creationId xmlns:a16="http://schemas.microsoft.com/office/drawing/2014/main" id="{DCCF7E2A-6864-0460-D2A0-72783D9F5120}"/>
-              </a:ext>
-            </a:extLst>
-          </p:cNvPr>
-          <p:cNvPicPr>
-            <a:picLocks noChangeAspect="1" noChangeArrowheads="1"/>
-          </p:cNvPicPr>
-          <p:nvPr/>
-        </p:nvPicPr>
-        <p:blipFill rotWithShape="1">
-          <a:blip r:embed="rId2">
-            <a:extLst>
-              <a:ext uri="{28A0092B-C50C-407E-A947-70E740481C1C}">
-                <a14:useLocalDpi xmlns:a14="http://schemas.microsoft.com/office/drawing/2010/main" val="0"/>
-              </a:ext>
-            </a:extLst>
-          </a:blip>
-          <a:srcRect l="34250"/>
-          <a:stretch/>
-        </p:blipFill>
-        <p:spPr bwMode="auto">
-          <a:xfrm>
-            <a:off x="6967913" y="1569604"/>
-            <a:ext cx="4670102" cy="3718791"/>
-          </a:xfrm>
-          <a:prstGeom prst="rect">
-            <a:avLst/>
-          </a:prstGeom>
-          <a:noFill/>
-          <a:extLst>
-            <a:ext uri="{909E8E84-426E-40DD-AFC4-6F175D3DCCD1}">
-              <a14:hiddenFill xmlns:a14="http://schemas.microsoft.com/office/drawing/2010/main">
-                <a:solidFill>
-                  <a:srgbClr val="FFFFFF"/>
-                </a:solidFill>
-              </a14:hiddenFill>
-            </a:ext>
-          </a:extLst>
-        </p:spPr>
-      </p:pic>
-    </p:spTree>
-    <p:extLst>
-      <p:ext uri="{BB962C8B-B14F-4D97-AF65-F5344CB8AC3E}">
-        <p14:creationId xmlns:p14="http://schemas.microsoft.com/office/powerpoint/2010/main" val="2988442547"/>
       </p:ext>
     </p:extLst>
   </p:cSld>
@@ -5273,6 +5731,800 @@
           <p:cNvPr id="2" name="Title 1">
             <a:extLst>
               <a:ext uri="{FF2B5EF4-FFF2-40B4-BE49-F238E27FC236}">
+                <a16:creationId xmlns:a16="http://schemas.microsoft.com/office/drawing/2014/main" id="{48708B6F-1B02-7A46-A79E-5A91AE93C9BD}"/>
+              </a:ext>
+            </a:extLst>
+          </p:cNvPr>
+          <p:cNvSpPr>
+            <a:spLocks noGrp="1"/>
+          </p:cNvSpPr>
+          <p:nvPr>
+            <p:ph type="title"/>
+          </p:nvPr>
+        </p:nvSpPr>
+        <p:spPr/>
+        <p:txBody>
+          <a:bodyPr/>
+          <a:lstStyle/>
+          <a:p>
+            <a:r>
+              <a:rPr lang="en-GB" dirty="0"/>
+              <a:t>Don’t be scared to read the traceback</a:t>
+            </a:r>
+            <a:br>
+              <a:rPr lang="en-GB" dirty="0"/>
+            </a:br>
+            <a:endParaRPr lang="en-US" dirty="0"/>
+          </a:p>
+        </p:txBody>
+      </p:sp>
+      <p:pic>
+        <p:nvPicPr>
+          <p:cNvPr id="5" name="Picture 4" descr="A picture containing diagram&#10;&#10;Description automatically generated">
+            <a:extLst>
+              <a:ext uri="{FF2B5EF4-FFF2-40B4-BE49-F238E27FC236}">
+                <a16:creationId xmlns:a16="http://schemas.microsoft.com/office/drawing/2014/main" id="{95C9E785-CECA-1E4B-9155-739AA390EB4F}"/>
+              </a:ext>
+            </a:extLst>
+          </p:cNvPr>
+          <p:cNvPicPr>
+            <a:picLocks noChangeAspect="1"/>
+          </p:cNvPicPr>
+          <p:nvPr/>
+        </p:nvPicPr>
+        <p:blipFill>
+          <a:blip r:embed="rId2"/>
+          <a:stretch>
+            <a:fillRect/>
+          </a:stretch>
+        </p:blipFill>
+        <p:spPr>
+          <a:xfrm>
+            <a:off x="0" y="1690688"/>
+            <a:ext cx="12834905" cy="2664958"/>
+          </a:xfrm>
+          <a:prstGeom prst="rect">
+            <a:avLst/>
+          </a:prstGeom>
+        </p:spPr>
+      </p:pic>
+      <p:sp>
+        <p:nvSpPr>
+          <p:cNvPr id="3" name="Up Arrow 2">
+            <a:extLst>
+              <a:ext uri="{FF2B5EF4-FFF2-40B4-BE49-F238E27FC236}">
+                <a16:creationId xmlns:a16="http://schemas.microsoft.com/office/drawing/2014/main" id="{69684A8A-AD1A-D142-B13E-4F1808AD09F3}"/>
+              </a:ext>
+            </a:extLst>
+          </p:cNvPr>
+          <p:cNvSpPr/>
+          <p:nvPr/>
+        </p:nvSpPr>
+        <p:spPr>
+          <a:xfrm>
+            <a:off x="502920" y="4355646"/>
+            <a:ext cx="502920" cy="811666"/>
+          </a:xfrm>
+          <a:prstGeom prst="upArrow">
+            <a:avLst/>
+          </a:prstGeom>
+        </p:spPr>
+        <p:style>
+          <a:lnRef idx="2">
+            <a:schemeClr val="accent1">
+              <a:shade val="50000"/>
+            </a:schemeClr>
+          </a:lnRef>
+          <a:fillRef idx="1">
+            <a:schemeClr val="accent1"/>
+          </a:fillRef>
+          <a:effectRef idx="0">
+            <a:schemeClr val="accent1"/>
+          </a:effectRef>
+          <a:fontRef idx="minor">
+            <a:schemeClr val="lt1"/>
+          </a:fontRef>
+        </p:style>
+        <p:txBody>
+          <a:bodyPr rtlCol="0" anchor="ctr"/>
+          <a:lstStyle/>
+          <a:p>
+            <a:pPr algn="ctr"/>
+            <a:endParaRPr lang="en-US"/>
+          </a:p>
+        </p:txBody>
+      </p:sp>
+      <p:sp>
+        <p:nvSpPr>
+          <p:cNvPr id="4" name="TextBox 3">
+            <a:extLst>
+              <a:ext uri="{FF2B5EF4-FFF2-40B4-BE49-F238E27FC236}">
+                <a16:creationId xmlns:a16="http://schemas.microsoft.com/office/drawing/2014/main" id="{913747A6-C2DE-4C40-AFD2-D0C9C2ABC088}"/>
+              </a:ext>
+            </a:extLst>
+          </p:cNvPr>
+          <p:cNvSpPr txBox="1"/>
+          <p:nvPr/>
+        </p:nvSpPr>
+        <p:spPr>
+          <a:xfrm>
+            <a:off x="0" y="5358043"/>
+            <a:ext cx="2604046" cy="646331"/>
+          </a:xfrm>
+          <a:prstGeom prst="rect">
+            <a:avLst/>
+          </a:prstGeom>
+          <a:noFill/>
+        </p:spPr>
+        <p:txBody>
+          <a:bodyPr wrap="none" rtlCol="0">
+            <a:spAutoFit/>
+          </a:bodyPr>
+          <a:lstStyle/>
+          <a:p>
+            <a:r>
+              <a:rPr lang="en-US" sz="3600" dirty="0"/>
+              <a:t>Type of Error</a:t>
+            </a:r>
+          </a:p>
+        </p:txBody>
+      </p:sp>
+      <p:sp>
+        <p:nvSpPr>
+          <p:cNvPr id="7" name="Oval 6">
+            <a:extLst>
+              <a:ext uri="{FF2B5EF4-FFF2-40B4-BE49-F238E27FC236}">
+                <a16:creationId xmlns:a16="http://schemas.microsoft.com/office/drawing/2014/main" id="{34E3D88A-1465-9947-B82D-DFF8E0B1AC59}"/>
+              </a:ext>
+            </a:extLst>
+          </p:cNvPr>
+          <p:cNvSpPr/>
+          <p:nvPr/>
+        </p:nvSpPr>
+        <p:spPr>
+          <a:xfrm>
+            <a:off x="1814052" y="3674219"/>
+            <a:ext cx="6386051" cy="811665"/>
+          </a:xfrm>
+          <a:prstGeom prst="ellipse">
+            <a:avLst/>
+          </a:prstGeom>
+          <a:noFill/>
+          <a:ln w="57150"/>
+        </p:spPr>
+        <p:style>
+          <a:lnRef idx="2">
+            <a:schemeClr val="accent1">
+              <a:shade val="50000"/>
+            </a:schemeClr>
+          </a:lnRef>
+          <a:fillRef idx="1">
+            <a:schemeClr val="accent1"/>
+          </a:fillRef>
+          <a:effectRef idx="0">
+            <a:schemeClr val="accent1"/>
+          </a:effectRef>
+          <a:fontRef idx="minor">
+            <a:schemeClr val="lt1"/>
+          </a:fontRef>
+        </p:style>
+        <p:txBody>
+          <a:bodyPr rtlCol="0" anchor="ctr"/>
+          <a:lstStyle/>
+          <a:p>
+            <a:pPr algn="ctr"/>
+            <a:endParaRPr lang="en-US"/>
+          </a:p>
+        </p:txBody>
+      </p:sp>
+      <p:cxnSp>
+        <p:nvCxnSpPr>
+          <p:cNvPr id="10" name="Straight Arrow Connector 9">
+            <a:extLst>
+              <a:ext uri="{FF2B5EF4-FFF2-40B4-BE49-F238E27FC236}">
+                <a16:creationId xmlns:a16="http://schemas.microsoft.com/office/drawing/2014/main" id="{E6054474-D2F3-8949-864F-15A65F22B966}"/>
+              </a:ext>
+            </a:extLst>
+          </p:cNvPr>
+          <p:cNvCxnSpPr>
+            <a:cxnSpLocks/>
+          </p:cNvCxnSpPr>
+          <p:nvPr/>
+        </p:nvCxnSpPr>
+        <p:spPr>
+          <a:xfrm flipH="1" flipV="1">
+            <a:off x="5412659" y="4546378"/>
+            <a:ext cx="943896" cy="497066"/>
+          </a:xfrm>
+          <a:prstGeom prst="straightConnector1">
+            <a:avLst/>
+          </a:prstGeom>
+          <a:ln w="76200">
+            <a:tailEnd type="triangle"/>
+          </a:ln>
+        </p:spPr>
+        <p:style>
+          <a:lnRef idx="1">
+            <a:schemeClr val="accent1"/>
+          </a:lnRef>
+          <a:fillRef idx="0">
+            <a:schemeClr val="accent1"/>
+          </a:fillRef>
+          <a:effectRef idx="0">
+            <a:schemeClr val="accent1"/>
+          </a:effectRef>
+          <a:fontRef idx="minor">
+            <a:schemeClr val="tx1"/>
+          </a:fontRef>
+        </p:style>
+      </p:cxnSp>
+      <p:sp>
+        <p:nvSpPr>
+          <p:cNvPr id="12" name="TextBox 11">
+            <a:extLst>
+              <a:ext uri="{FF2B5EF4-FFF2-40B4-BE49-F238E27FC236}">
+                <a16:creationId xmlns:a16="http://schemas.microsoft.com/office/drawing/2014/main" id="{6BD9A0A3-C2A3-4E45-AF34-5FB46212CBC0}"/>
+              </a:ext>
+            </a:extLst>
+          </p:cNvPr>
+          <p:cNvSpPr txBox="1"/>
+          <p:nvPr/>
+        </p:nvSpPr>
+        <p:spPr>
+          <a:xfrm>
+            <a:off x="6597446" y="4844146"/>
+            <a:ext cx="2856808" cy="646331"/>
+          </a:xfrm>
+          <a:prstGeom prst="rect">
+            <a:avLst/>
+          </a:prstGeom>
+          <a:noFill/>
+        </p:spPr>
+        <p:txBody>
+          <a:bodyPr wrap="none" rtlCol="0">
+            <a:spAutoFit/>
+          </a:bodyPr>
+          <a:lstStyle/>
+          <a:p>
+            <a:r>
+              <a:rPr lang="en-US" sz="3600" dirty="0"/>
+              <a:t>Error message</a:t>
+            </a:r>
+          </a:p>
+        </p:txBody>
+      </p:sp>
+    </p:spTree>
+    <p:extLst>
+      <p:ext uri="{BB962C8B-B14F-4D97-AF65-F5344CB8AC3E}">
+        <p14:creationId xmlns:p14="http://schemas.microsoft.com/office/powerpoint/2010/main" val="1779095242"/>
+      </p:ext>
+    </p:extLst>
+  </p:cSld>
+  <p:clrMapOvr>
+    <a:masterClrMapping/>
+  </p:clrMapOvr>
+</p:sld>
+</file>
+
+<file path=ppt/slides/slide21.xml><?xml version="1.0" encoding="utf-8"?>
+<p:sld xmlns:a="http://schemas.openxmlformats.org/drawingml/2006/main" xmlns:r="http://schemas.openxmlformats.org/officeDocument/2006/relationships" xmlns:p="http://schemas.openxmlformats.org/presentationml/2006/main">
+  <p:cSld>
+    <p:spTree>
+      <p:nvGrpSpPr>
+        <p:cNvPr id="1" name=""/>
+        <p:cNvGrpSpPr/>
+        <p:nvPr/>
+      </p:nvGrpSpPr>
+      <p:grpSpPr>
+        <a:xfrm>
+          <a:off x="0" y="0"/>
+          <a:ext cx="0" cy="0"/>
+          <a:chOff x="0" y="0"/>
+          <a:chExt cx="0" cy="0"/>
+        </a:xfrm>
+      </p:grpSpPr>
+      <p:sp>
+        <p:nvSpPr>
+          <p:cNvPr id="2" name="Title 1">
+            <a:extLst>
+              <a:ext uri="{FF2B5EF4-FFF2-40B4-BE49-F238E27FC236}">
+                <a16:creationId xmlns:a16="http://schemas.microsoft.com/office/drawing/2014/main" id="{48708B6F-1B02-7A46-A79E-5A91AE93C9BD}"/>
+              </a:ext>
+            </a:extLst>
+          </p:cNvPr>
+          <p:cNvSpPr>
+            <a:spLocks noGrp="1"/>
+          </p:cNvSpPr>
+          <p:nvPr>
+            <p:ph type="title"/>
+          </p:nvPr>
+        </p:nvSpPr>
+        <p:spPr/>
+        <p:txBody>
+          <a:bodyPr/>
+          <a:lstStyle/>
+          <a:p>
+            <a:r>
+              <a:rPr lang="en-GB" dirty="0"/>
+              <a:t>Don’t be scared to read the traceback</a:t>
+            </a:r>
+            <a:br>
+              <a:rPr lang="en-GB" dirty="0"/>
+            </a:br>
+            <a:endParaRPr lang="en-US" dirty="0"/>
+          </a:p>
+        </p:txBody>
+      </p:sp>
+      <p:pic>
+        <p:nvPicPr>
+          <p:cNvPr id="5" name="Picture 4" descr="A picture containing diagram&#10;&#10;Description automatically generated">
+            <a:extLst>
+              <a:ext uri="{FF2B5EF4-FFF2-40B4-BE49-F238E27FC236}">
+                <a16:creationId xmlns:a16="http://schemas.microsoft.com/office/drawing/2014/main" id="{95C9E785-CECA-1E4B-9155-739AA390EB4F}"/>
+              </a:ext>
+            </a:extLst>
+          </p:cNvPr>
+          <p:cNvPicPr>
+            <a:picLocks noChangeAspect="1"/>
+          </p:cNvPicPr>
+          <p:nvPr/>
+        </p:nvPicPr>
+        <p:blipFill>
+          <a:blip r:embed="rId2"/>
+          <a:stretch>
+            <a:fillRect/>
+          </a:stretch>
+        </p:blipFill>
+        <p:spPr>
+          <a:xfrm>
+            <a:off x="0" y="1690688"/>
+            <a:ext cx="12834905" cy="2664958"/>
+          </a:xfrm>
+          <a:prstGeom prst="rect">
+            <a:avLst/>
+          </a:prstGeom>
+        </p:spPr>
+      </p:pic>
+      <p:sp>
+        <p:nvSpPr>
+          <p:cNvPr id="3" name="Rectangle 2">
+            <a:extLst>
+              <a:ext uri="{FF2B5EF4-FFF2-40B4-BE49-F238E27FC236}">
+                <a16:creationId xmlns:a16="http://schemas.microsoft.com/office/drawing/2014/main" id="{CC60FFFE-B3AD-044A-B77B-C1FDB4B43614}"/>
+              </a:ext>
+            </a:extLst>
+          </p:cNvPr>
+          <p:cNvSpPr/>
+          <p:nvPr/>
+        </p:nvSpPr>
+        <p:spPr>
+          <a:xfrm>
+            <a:off x="838200" y="4738549"/>
+            <a:ext cx="9818908" cy="1754326"/>
+          </a:xfrm>
+          <a:prstGeom prst="rect">
+            <a:avLst/>
+          </a:prstGeom>
+        </p:spPr>
+        <p:txBody>
+          <a:bodyPr wrap="square">
+            <a:spAutoFit/>
+          </a:bodyPr>
+          <a:lstStyle/>
+          <a:p>
+            <a:r>
+              <a:rPr lang="en-US" sz="3600" dirty="0" err="1"/>
+              <a:t>RealPython</a:t>
+            </a:r>
+            <a:r>
+              <a:rPr lang="en-US" sz="3600" dirty="0"/>
+              <a:t> website has nice explanations of what each error type means:</a:t>
+            </a:r>
+          </a:p>
+          <a:p>
+            <a:r>
+              <a:rPr lang="en-US" sz="3600" dirty="0"/>
+              <a:t>https://</a:t>
+            </a:r>
+            <a:r>
+              <a:rPr lang="en-US" sz="3600" dirty="0" err="1"/>
+              <a:t>realpython.com</a:t>
+            </a:r>
+            <a:r>
+              <a:rPr lang="en-US" sz="3600" dirty="0"/>
+              <a:t>/python-traceback/</a:t>
+            </a:r>
+          </a:p>
+        </p:txBody>
+      </p:sp>
+    </p:spTree>
+    <p:extLst>
+      <p:ext uri="{BB962C8B-B14F-4D97-AF65-F5344CB8AC3E}">
+        <p14:creationId xmlns:p14="http://schemas.microsoft.com/office/powerpoint/2010/main" val="4048530283"/>
+      </p:ext>
+    </p:extLst>
+  </p:cSld>
+  <p:clrMapOvr>
+    <a:masterClrMapping/>
+  </p:clrMapOvr>
+</p:sld>
+</file>
+
+<file path=ppt/slides/slide22.xml><?xml version="1.0" encoding="utf-8"?>
+<p:sld xmlns:a="http://schemas.openxmlformats.org/drawingml/2006/main" xmlns:r="http://schemas.openxmlformats.org/officeDocument/2006/relationships" xmlns:p="http://schemas.openxmlformats.org/presentationml/2006/main">
+  <p:cSld>
+    <p:spTree>
+      <p:nvGrpSpPr>
+        <p:cNvPr id="1" name=""/>
+        <p:cNvGrpSpPr/>
+        <p:nvPr/>
+      </p:nvGrpSpPr>
+      <p:grpSpPr>
+        <a:xfrm>
+          <a:off x="0" y="0"/>
+          <a:ext cx="0" cy="0"/>
+          <a:chOff x="0" y="0"/>
+          <a:chExt cx="0" cy="0"/>
+        </a:xfrm>
+      </p:grpSpPr>
+      <p:sp>
+        <p:nvSpPr>
+          <p:cNvPr id="2" name="Title 1">
+            <a:extLst>
+              <a:ext uri="{FF2B5EF4-FFF2-40B4-BE49-F238E27FC236}">
+                <a16:creationId xmlns:a16="http://schemas.microsoft.com/office/drawing/2014/main" id="{4B68D123-7163-B9F9-F1D2-969BF73BBFB1}"/>
+              </a:ext>
+            </a:extLst>
+          </p:cNvPr>
+          <p:cNvSpPr>
+            <a:spLocks noGrp="1"/>
+          </p:cNvSpPr>
+          <p:nvPr>
+            <p:ph type="title"/>
+          </p:nvPr>
+        </p:nvSpPr>
+        <p:spPr>
+          <a:xfrm>
+            <a:off x="630382" y="-85726"/>
+            <a:ext cx="10515600" cy="1325563"/>
+          </a:xfrm>
+        </p:spPr>
+        <p:txBody>
+          <a:bodyPr/>
+          <a:lstStyle/>
+          <a:p>
+            <a:r>
+              <a:rPr lang="en-US" dirty="0"/>
+              <a:t>Rubber Duck Debugging</a:t>
+            </a:r>
+          </a:p>
+        </p:txBody>
+      </p:sp>
+      <p:sp>
+        <p:nvSpPr>
+          <p:cNvPr id="3" name="Content Placeholder 2">
+            <a:extLst>
+              <a:ext uri="{FF2B5EF4-FFF2-40B4-BE49-F238E27FC236}">
+                <a16:creationId xmlns:a16="http://schemas.microsoft.com/office/drawing/2014/main" id="{DABF208C-58B9-2FD7-034D-85CD3F94FD99}"/>
+              </a:ext>
+            </a:extLst>
+          </p:cNvPr>
+          <p:cNvSpPr>
+            <a:spLocks noGrp="1"/>
+          </p:cNvSpPr>
+          <p:nvPr>
+            <p:ph idx="1"/>
+          </p:nvPr>
+        </p:nvSpPr>
+        <p:spPr>
+          <a:xfrm>
+            <a:off x="553985" y="1581784"/>
+            <a:ext cx="5877295" cy="4361815"/>
+          </a:xfrm>
+        </p:spPr>
+        <p:txBody>
+          <a:bodyPr>
+            <a:normAutofit fontScale="92500" lnSpcReduction="20000"/>
+          </a:bodyPr>
+          <a:lstStyle/>
+          <a:p>
+            <a:pPr marL="514350" indent="-514350" algn="l" fontAlgn="base">
+              <a:buFont typeface="+mj-lt"/>
+              <a:buAutoNum type="arabicParenR"/>
+            </a:pPr>
+            <a:r>
+              <a:rPr lang="en-GB" u="none" strike="noStrike" dirty="0">
+                <a:effectLst/>
+              </a:rPr>
+              <a:t>Place rubber duck on desk and inform it you are just going to go over some code with it, if that’s all right.</a:t>
+            </a:r>
+          </a:p>
+          <a:p>
+            <a:pPr marL="514350" indent="-514350" algn="l" fontAlgn="base">
+              <a:buFont typeface="+mj-lt"/>
+              <a:buAutoNum type="arabicParenR"/>
+            </a:pPr>
+            <a:r>
+              <a:rPr lang="en-GB" u="none" strike="noStrike" dirty="0">
+                <a:effectLst/>
+              </a:rPr>
+              <a:t>Explain to the duck what your code is supposed to do, and then go into detail and explain your code line by line.</a:t>
+            </a:r>
+          </a:p>
+          <a:p>
+            <a:pPr marL="514350" indent="-514350" algn="l" fontAlgn="base">
+              <a:buFont typeface="+mj-lt"/>
+              <a:buAutoNum type="arabicParenR"/>
+            </a:pPr>
+            <a:r>
+              <a:rPr lang="en-GB" u="none" strike="noStrike" dirty="0">
+                <a:effectLst/>
+              </a:rPr>
+              <a:t>At some point you will tell the duck what you are doing next and then realise that that is not in fact what you are actually doing. The duck will sit there serenely, happy in the knowledge that it has helped you on your way.</a:t>
+            </a:r>
+          </a:p>
+        </p:txBody>
+      </p:sp>
+      <p:pic>
+        <p:nvPicPr>
+          <p:cNvPr id="1028" name="Picture 4" descr="Rubber Duck Debugging. Wheres my rubber duck!? | by Kelly Dobbins | Medium">
+            <a:extLst>
+              <a:ext uri="{FF2B5EF4-FFF2-40B4-BE49-F238E27FC236}">
+                <a16:creationId xmlns:a16="http://schemas.microsoft.com/office/drawing/2014/main" id="{DCCF7E2A-6864-0460-D2A0-72783D9F5120}"/>
+              </a:ext>
+            </a:extLst>
+          </p:cNvPr>
+          <p:cNvPicPr>
+            <a:picLocks noChangeAspect="1" noChangeArrowheads="1"/>
+          </p:cNvPicPr>
+          <p:nvPr/>
+        </p:nvPicPr>
+        <p:blipFill rotWithShape="1">
+          <a:blip r:embed="rId2">
+            <a:extLst>
+              <a:ext uri="{28A0092B-C50C-407E-A947-70E740481C1C}">
+                <a14:useLocalDpi xmlns:a14="http://schemas.microsoft.com/office/drawing/2010/main" val="0"/>
+              </a:ext>
+            </a:extLst>
+          </a:blip>
+          <a:srcRect l="34250"/>
+          <a:stretch/>
+        </p:blipFill>
+        <p:spPr bwMode="auto">
+          <a:xfrm>
+            <a:off x="6967913" y="1569604"/>
+            <a:ext cx="4670102" cy="3718791"/>
+          </a:xfrm>
+          <a:prstGeom prst="rect">
+            <a:avLst/>
+          </a:prstGeom>
+          <a:noFill/>
+          <a:extLst>
+            <a:ext uri="{909E8E84-426E-40DD-AFC4-6F175D3DCCD1}">
+              <a14:hiddenFill xmlns:a14="http://schemas.microsoft.com/office/drawing/2010/main">
+                <a:solidFill>
+                  <a:srgbClr val="FFFFFF"/>
+                </a:solidFill>
+              </a14:hiddenFill>
+            </a:ext>
+          </a:extLst>
+        </p:spPr>
+      </p:pic>
+    </p:spTree>
+    <p:extLst>
+      <p:ext uri="{BB962C8B-B14F-4D97-AF65-F5344CB8AC3E}">
+        <p14:creationId xmlns:p14="http://schemas.microsoft.com/office/powerpoint/2010/main" val="2988442547"/>
+      </p:ext>
+    </p:extLst>
+  </p:cSld>
+  <p:clrMapOvr>
+    <a:masterClrMapping/>
+  </p:clrMapOvr>
+  <p:timing>
+    <p:tnLst>
+      <p:par>
+        <p:cTn id="1" dur="indefinite" restart="never" nodeType="tmRoot">
+          <p:childTnLst>
+            <p:seq concurrent="1" nextAc="seek">
+              <p:cTn id="2" dur="indefinite" nodeType="mainSeq">
+                <p:childTnLst>
+                  <p:par>
+                    <p:cTn id="3" fill="hold">
+                      <p:stCondLst>
+                        <p:cond delay="indefinite"/>
+                      </p:stCondLst>
+                      <p:childTnLst>
+                        <p:par>
+                          <p:cTn id="4" fill="hold">
+                            <p:stCondLst>
+                              <p:cond delay="0"/>
+                            </p:stCondLst>
+                            <p:childTnLst>
+                              <p:par>
+                                <p:cTn id="5" presetID="1" presetClass="entr" presetSubtype="0" fill="hold" grpId="0" nodeType="clickEffect">
+                                  <p:stCondLst>
+                                    <p:cond delay="0"/>
+                                  </p:stCondLst>
+                                  <p:childTnLst>
+                                    <p:set>
+                                      <p:cBhvr>
+                                        <p:cTn id="6" dur="1" fill="hold">
+                                          <p:stCondLst>
+                                            <p:cond delay="0"/>
+                                          </p:stCondLst>
+                                        </p:cTn>
+                                        <p:tgtEl>
+                                          <p:spTgt spid="3">
+                                            <p:txEl>
+                                              <p:pRg st="0" end="0"/>
+                                            </p:txEl>
+                                          </p:spTgt>
+                                        </p:tgtEl>
+                                        <p:attrNameLst>
+                                          <p:attrName>style.visibility</p:attrName>
+                                        </p:attrNameLst>
+                                      </p:cBhvr>
+                                      <p:to>
+                                        <p:strVal val="visible"/>
+                                      </p:to>
+                                    </p:set>
+                                  </p:childTnLst>
+                                </p:cTn>
+                              </p:par>
+                            </p:childTnLst>
+                          </p:cTn>
+                        </p:par>
+                      </p:childTnLst>
+                    </p:cTn>
+                  </p:par>
+                  <p:par>
+                    <p:cTn id="7" fill="hold">
+                      <p:stCondLst>
+                        <p:cond delay="indefinite"/>
+                      </p:stCondLst>
+                      <p:childTnLst>
+                        <p:par>
+                          <p:cTn id="8" fill="hold">
+                            <p:stCondLst>
+                              <p:cond delay="0"/>
+                            </p:stCondLst>
+                            <p:childTnLst>
+                              <p:par>
+                                <p:cTn id="9" presetID="1" presetClass="entr" presetSubtype="0" fill="hold" grpId="0" nodeType="clickEffect">
+                                  <p:stCondLst>
+                                    <p:cond delay="0"/>
+                                  </p:stCondLst>
+                                  <p:childTnLst>
+                                    <p:set>
+                                      <p:cBhvr>
+                                        <p:cTn id="10" dur="1" fill="hold">
+                                          <p:stCondLst>
+                                            <p:cond delay="0"/>
+                                          </p:stCondLst>
+                                        </p:cTn>
+                                        <p:tgtEl>
+                                          <p:spTgt spid="3">
+                                            <p:txEl>
+                                              <p:pRg st="1" end="1"/>
+                                            </p:txEl>
+                                          </p:spTgt>
+                                        </p:tgtEl>
+                                        <p:attrNameLst>
+                                          <p:attrName>style.visibility</p:attrName>
+                                        </p:attrNameLst>
+                                      </p:cBhvr>
+                                      <p:to>
+                                        <p:strVal val="visible"/>
+                                      </p:to>
+                                    </p:set>
+                                  </p:childTnLst>
+                                </p:cTn>
+                              </p:par>
+                            </p:childTnLst>
+                          </p:cTn>
+                        </p:par>
+                      </p:childTnLst>
+                    </p:cTn>
+                  </p:par>
+                  <p:par>
+                    <p:cTn id="11" fill="hold">
+                      <p:stCondLst>
+                        <p:cond delay="indefinite"/>
+                      </p:stCondLst>
+                      <p:childTnLst>
+                        <p:par>
+                          <p:cTn id="12" fill="hold">
+                            <p:stCondLst>
+                              <p:cond delay="0"/>
+                            </p:stCondLst>
+                            <p:childTnLst>
+                              <p:par>
+                                <p:cTn id="13" presetID="1" presetClass="entr" presetSubtype="0" fill="hold" grpId="0" nodeType="clickEffect">
+                                  <p:stCondLst>
+                                    <p:cond delay="0"/>
+                                  </p:stCondLst>
+                                  <p:childTnLst>
+                                    <p:set>
+                                      <p:cBhvr>
+                                        <p:cTn id="14" dur="1" fill="hold">
+                                          <p:stCondLst>
+                                            <p:cond delay="0"/>
+                                          </p:stCondLst>
+                                        </p:cTn>
+                                        <p:tgtEl>
+                                          <p:spTgt spid="3">
+                                            <p:txEl>
+                                              <p:pRg st="2" end="2"/>
+                                            </p:txEl>
+                                          </p:spTgt>
+                                        </p:tgtEl>
+                                        <p:attrNameLst>
+                                          <p:attrName>style.visibility</p:attrName>
+                                        </p:attrNameLst>
+                                      </p:cBhvr>
+                                      <p:to>
+                                        <p:strVal val="visible"/>
+                                      </p:to>
+                                    </p:set>
+                                  </p:childTnLst>
+                                </p:cTn>
+                              </p:par>
+                            </p:childTnLst>
+                          </p:cTn>
+                        </p:par>
+                      </p:childTnLst>
+                    </p:cTn>
+                  </p:par>
+                </p:childTnLst>
+              </p:cTn>
+              <p:prevCondLst>
+                <p:cond evt="onPrev" delay="0">
+                  <p:tgtEl>
+                    <p:sldTgt/>
+                  </p:tgtEl>
+                </p:cond>
+              </p:prevCondLst>
+              <p:nextCondLst>
+                <p:cond evt="onNext" delay="0">
+                  <p:tgtEl>
+                    <p:sldTgt/>
+                  </p:tgtEl>
+                </p:cond>
+              </p:nextCondLst>
+            </p:seq>
+          </p:childTnLst>
+        </p:cTn>
+      </p:par>
+    </p:tnLst>
+    <p:bldLst>
+      <p:bldP spid="3" grpId="0" build="p"/>
+    </p:bldLst>
+  </p:timing>
+</p:sld>
+</file>
+
+<file path=ppt/slides/slide23.xml><?xml version="1.0" encoding="utf-8"?>
+<p:sld xmlns:a="http://schemas.openxmlformats.org/drawingml/2006/main" xmlns:r="http://schemas.openxmlformats.org/officeDocument/2006/relationships" xmlns:p="http://schemas.openxmlformats.org/presentationml/2006/main">
+  <p:cSld>
+    <p:spTree>
+      <p:nvGrpSpPr>
+        <p:cNvPr id="1" name=""/>
+        <p:cNvGrpSpPr/>
+        <p:nvPr/>
+      </p:nvGrpSpPr>
+      <p:grpSpPr>
+        <a:xfrm>
+          <a:off x="0" y="0"/>
+          <a:ext cx="0" cy="0"/>
+          <a:chOff x="0" y="0"/>
+          <a:chExt cx="0" cy="0"/>
+        </a:xfrm>
+      </p:grpSpPr>
+      <p:sp>
+        <p:nvSpPr>
+          <p:cNvPr id="2" name="Title 1">
+            <a:extLst>
+              <a:ext uri="{FF2B5EF4-FFF2-40B4-BE49-F238E27FC236}">
                 <a16:creationId xmlns:a16="http://schemas.microsoft.com/office/drawing/2014/main" id="{4B68D123-7163-B9F9-F1D2-969BF73BBFB1}"/>
               </a:ext>
             </a:extLst>
@@ -5319,8 +6571,8 @@
         </p:nvSpPr>
         <p:spPr>
           <a:xfrm>
-            <a:off x="838200" y="1825625"/>
-            <a:ext cx="4302760" cy="4351338"/>
+            <a:off x="166254" y="1825625"/>
+            <a:ext cx="5497946" cy="4351338"/>
           </a:xfrm>
         </p:spPr>
         <p:txBody>
@@ -5333,6 +6585,32 @@
             </a:r>
           </a:p>
           <a:p>
+            <a:endParaRPr lang="en-US" dirty="0"/>
+          </a:p>
+          <a:p>
+            <a:r>
+              <a:rPr lang="en-US" dirty="0"/>
+              <a:t>No really. I’m not joking.  It is really used by professional software engineers. </a:t>
+            </a:r>
+          </a:p>
+          <a:p>
+            <a:endParaRPr lang="en-US" dirty="0"/>
+          </a:p>
+          <a:p>
+            <a:r>
+              <a:rPr lang="en-US" dirty="0"/>
+              <a:t>https://</a:t>
+            </a:r>
+            <a:r>
+              <a:rPr lang="en-US" dirty="0" err="1"/>
+              <a:t>rubberduckdebugging.com</a:t>
+            </a:r>
+            <a:endParaRPr lang="en-US" dirty="0"/>
+          </a:p>
+          <a:p>
+            <a:pPr marL="0" indent="0">
+              <a:buNone/>
+            </a:pPr>
             <a:endParaRPr lang="en-US" dirty="0"/>
           </a:p>
           <a:p>
@@ -5372,8 +6650,8 @@
         </p:blipFill>
         <p:spPr bwMode="auto">
           <a:xfrm>
-            <a:off x="5555673" y="1324408"/>
-            <a:ext cx="6470073" cy="4852555"/>
+            <a:off x="5816600" y="1324408"/>
+            <a:ext cx="6209146" cy="4852555"/>
           </a:xfrm>
           <a:prstGeom prst="rect">
             <a:avLst/>
@@ -5400,6 +6678,235 @@
   <p:clrMapOvr>
     <a:masterClrMapping/>
   </p:clrMapOvr>
+  <p:timing>
+    <p:tnLst>
+      <p:par>
+        <p:cTn id="1" dur="indefinite" restart="never" nodeType="tmRoot">
+          <p:childTnLst>
+            <p:seq concurrent="1" nextAc="seek">
+              <p:cTn id="2" dur="indefinite" nodeType="mainSeq">
+                <p:childTnLst>
+                  <p:par>
+                    <p:cTn id="3" fill="hold">
+                      <p:stCondLst>
+                        <p:cond delay="indefinite"/>
+                      </p:stCondLst>
+                      <p:childTnLst>
+                        <p:par>
+                          <p:cTn id="4" fill="hold">
+                            <p:stCondLst>
+                              <p:cond delay="0"/>
+                            </p:stCondLst>
+                            <p:childTnLst>
+                              <p:par>
+                                <p:cTn id="5" presetID="1" presetClass="entr" presetSubtype="0" fill="hold" grpId="0" nodeType="clickEffect">
+                                  <p:stCondLst>
+                                    <p:cond delay="0"/>
+                                  </p:stCondLst>
+                                  <p:childTnLst>
+                                    <p:set>
+                                      <p:cBhvr>
+                                        <p:cTn id="6" dur="1" fill="hold">
+                                          <p:stCondLst>
+                                            <p:cond delay="0"/>
+                                          </p:stCondLst>
+                                        </p:cTn>
+                                        <p:tgtEl>
+                                          <p:spTgt spid="3">
+                                            <p:txEl>
+                                              <p:pRg st="0" end="0"/>
+                                            </p:txEl>
+                                          </p:spTgt>
+                                        </p:tgtEl>
+                                        <p:attrNameLst>
+                                          <p:attrName>style.visibility</p:attrName>
+                                        </p:attrNameLst>
+                                      </p:cBhvr>
+                                      <p:to>
+                                        <p:strVal val="visible"/>
+                                      </p:to>
+                                    </p:set>
+                                  </p:childTnLst>
+                                </p:cTn>
+                              </p:par>
+                            </p:childTnLst>
+                          </p:cTn>
+                        </p:par>
+                      </p:childTnLst>
+                    </p:cTn>
+                  </p:par>
+                  <p:par>
+                    <p:cTn id="7" fill="hold">
+                      <p:stCondLst>
+                        <p:cond delay="indefinite"/>
+                      </p:stCondLst>
+                      <p:childTnLst>
+                        <p:par>
+                          <p:cTn id="8" fill="hold">
+                            <p:stCondLst>
+                              <p:cond delay="0"/>
+                            </p:stCondLst>
+                            <p:childTnLst>
+                              <p:par>
+                                <p:cTn id="9" presetID="1" presetClass="entr" presetSubtype="0" fill="hold" grpId="0" nodeType="clickEffect">
+                                  <p:stCondLst>
+                                    <p:cond delay="0"/>
+                                  </p:stCondLst>
+                                  <p:childTnLst>
+                                    <p:set>
+                                      <p:cBhvr>
+                                        <p:cTn id="10" dur="1" fill="hold">
+                                          <p:stCondLst>
+                                            <p:cond delay="0"/>
+                                          </p:stCondLst>
+                                        </p:cTn>
+                                        <p:tgtEl>
+                                          <p:spTgt spid="3">
+                                            <p:txEl>
+                                              <p:pRg st="2" end="2"/>
+                                            </p:txEl>
+                                          </p:spTgt>
+                                        </p:tgtEl>
+                                        <p:attrNameLst>
+                                          <p:attrName>style.visibility</p:attrName>
+                                        </p:attrNameLst>
+                                      </p:cBhvr>
+                                      <p:to>
+                                        <p:strVal val="visible"/>
+                                      </p:to>
+                                    </p:set>
+                                  </p:childTnLst>
+                                </p:cTn>
+                              </p:par>
+                            </p:childTnLst>
+                          </p:cTn>
+                        </p:par>
+                      </p:childTnLst>
+                    </p:cTn>
+                  </p:par>
+                  <p:par>
+                    <p:cTn id="11" fill="hold">
+                      <p:stCondLst>
+                        <p:cond delay="indefinite"/>
+                      </p:stCondLst>
+                      <p:childTnLst>
+                        <p:par>
+                          <p:cTn id="12" fill="hold">
+                            <p:stCondLst>
+                              <p:cond delay="0"/>
+                            </p:stCondLst>
+                            <p:childTnLst>
+                              <p:par>
+                                <p:cTn id="13" presetID="1" presetClass="entr" presetSubtype="0" fill="hold" grpId="0" nodeType="clickEffect">
+                                  <p:stCondLst>
+                                    <p:cond delay="0"/>
+                                  </p:stCondLst>
+                                  <p:childTnLst>
+                                    <p:set>
+                                      <p:cBhvr>
+                                        <p:cTn id="14" dur="1" fill="hold">
+                                          <p:stCondLst>
+                                            <p:cond delay="0"/>
+                                          </p:stCondLst>
+                                        </p:cTn>
+                                        <p:tgtEl>
+                                          <p:spTgt spid="3">
+                                            <p:txEl>
+                                              <p:pRg st="4" end="4"/>
+                                            </p:txEl>
+                                          </p:spTgt>
+                                        </p:tgtEl>
+                                        <p:attrNameLst>
+                                          <p:attrName>style.visibility</p:attrName>
+                                        </p:attrNameLst>
+                                      </p:cBhvr>
+                                      <p:to>
+                                        <p:strVal val="visible"/>
+                                      </p:to>
+                                    </p:set>
+                                  </p:childTnLst>
+                                </p:cTn>
+                              </p:par>
+                            </p:childTnLst>
+                          </p:cTn>
+                        </p:par>
+                      </p:childTnLst>
+                    </p:cTn>
+                  </p:par>
+                  <p:par>
+                    <p:cTn id="15" fill="hold">
+                      <p:stCondLst>
+                        <p:cond delay="indefinite"/>
+                      </p:stCondLst>
+                      <p:childTnLst>
+                        <p:par>
+                          <p:cTn id="16" fill="hold">
+                            <p:stCondLst>
+                              <p:cond delay="0"/>
+                            </p:stCondLst>
+                            <p:childTnLst>
+                              <p:par>
+                                <p:cTn id="17" presetID="1" presetClass="entr" presetSubtype="0" fill="hold" grpId="0" nodeType="clickEffect">
+                                  <p:stCondLst>
+                                    <p:cond delay="0"/>
+                                  </p:stCondLst>
+                                  <p:childTnLst>
+                                    <p:set>
+                                      <p:cBhvr>
+                                        <p:cTn id="18" dur="1" fill="hold">
+                                          <p:stCondLst>
+                                            <p:cond delay="0"/>
+                                          </p:stCondLst>
+                                        </p:cTn>
+                                        <p:tgtEl>
+                                          <p:spTgt spid="3">
+                                            <p:txEl>
+                                              <p:pRg st="6" end="6"/>
+                                            </p:txEl>
+                                          </p:spTgt>
+                                        </p:tgtEl>
+                                        <p:attrNameLst>
+                                          <p:attrName>style.visibility</p:attrName>
+                                        </p:attrNameLst>
+                                      </p:cBhvr>
+                                      <p:to>
+                                        <p:strVal val="visible"/>
+                                      </p:to>
+                                    </p:set>
+                                  </p:childTnLst>
+                                </p:cTn>
+                              </p:par>
+                            </p:childTnLst>
+                          </p:cTn>
+                        </p:par>
+                      </p:childTnLst>
+                    </p:cTn>
+                  </p:par>
+                </p:childTnLst>
+              </p:cTn>
+              <p:prevCondLst>
+                <p:cond evt="onPrev" delay="0">
+                  <p:tgtEl>
+                    <p:sldTgt/>
+                  </p:tgtEl>
+                </p:cond>
+              </p:prevCondLst>
+              <p:nextCondLst>
+                <p:cond evt="onNext" delay="0">
+                  <p:tgtEl>
+                    <p:sldTgt/>
+                  </p:tgtEl>
+                </p:cond>
+              </p:nextCondLst>
+            </p:seq>
+          </p:childTnLst>
+        </p:cTn>
+      </p:par>
+    </p:tnLst>
+    <p:bldLst>
+      <p:bldP spid="3" grpId="0" build="p"/>
+    </p:bldLst>
+  </p:timing>
 </p:sld>
 </file>
 

</xml_diff>